<commit_message>
(Anthony Balmeo) uploading updated midterm presentation slide
this is the most up to date midterm presentation that we just presented
last week.
</commit_message>
<xml_diff>
--- a/doc/midterm_presentation.pptx
+++ b/doc/midterm_presentation.pptx
@@ -5,7 +5,7 @@
     <p:sldMasterId id="2147483672" r:id="rId1"/>
   </p:sldMasterIdLst>
   <p:notesMasterIdLst>
-    <p:notesMasterId r:id="rId20"/>
+    <p:notesMasterId r:id="rId21"/>
   </p:notesMasterIdLst>
   <p:sldIdLst>
     <p:sldId id="256" r:id="rId2"/>
@@ -19,13 +19,14 @@
     <p:sldId id="264" r:id="rId10"/>
     <p:sldId id="265" r:id="rId11"/>
     <p:sldId id="266" r:id="rId12"/>
-    <p:sldId id="267" r:id="rId13"/>
-    <p:sldId id="268" r:id="rId14"/>
-    <p:sldId id="269" r:id="rId15"/>
-    <p:sldId id="270" r:id="rId16"/>
+    <p:sldId id="268" r:id="rId13"/>
+    <p:sldId id="267" r:id="rId14"/>
+    <p:sldId id="274" r:id="rId15"/>
+    <p:sldId id="275" r:id="rId16"/>
     <p:sldId id="271" r:id="rId17"/>
     <p:sldId id="272" r:id="rId18"/>
     <p:sldId id="273" r:id="rId19"/>
+    <p:sldId id="270" r:id="rId20"/>
   </p:sldIdLst>
   <p:sldSz cx="9144000" cy="6858000" type="screen4x3"/>
   <p:notesSz cx="6858000" cy="9144000"/>
@@ -209,7 +210,7 @@
           <a:p>
             <a:fld id="{B02F4689-6D44-45C5-936E-453627548D96}" type="datetimeFigureOut">
               <a:rPr lang="en-US" smtClean="0"/>
-              <a:t>11/4/11</a:t>
+              <a:t>11/7/11</a:t>
             </a:fld>
             <a:endParaRPr lang="en-US"/>
           </a:p>
@@ -521,14 +522,6 @@
           <a:bodyPr/>
           <a:lstStyle/>
           <a:p>
-            <a:r>
-              <a:rPr lang="en-US" dirty="0" smtClean="0"/>
-              <a:t>There was a lot of information under each component</a:t>
-            </a:r>
-            <a:r>
-              <a:rPr lang="en-US" baseline="0" dirty="0" smtClean="0"/>
-              <a:t> which I removed because Zorro or Zach could elaborate on them.</a:t>
-            </a:r>
             <a:endParaRPr lang="en-US" dirty="0"/>
           </a:p>
         </p:txBody>
@@ -550,7 +543,7 @@
           <a:p>
             <a:fld id="{1A6845E6-538C-49EA-A830-9072524FC492}" type="slidenum">
               <a:rPr lang="en-US" smtClean="0"/>
-              <a:t>13</a:t>
+              <a:t>7</a:t>
             </a:fld>
             <a:endParaRPr lang="en-US"/>
           </a:p>
@@ -559,7 +552,7 @@
     </p:spTree>
     <p:extLst>
       <p:ext uri="{BB962C8B-B14F-4D97-AF65-F5344CB8AC3E}">
-        <p14:creationId xmlns:p14="http://schemas.microsoft.com/office/powerpoint/2010/main" val="1767483421"/>
+        <p14:creationId xmlns:p14="http://schemas.microsoft.com/office/powerpoint/2010/main" val="823327097"/>
       </p:ext>
     </p:extLst>
   </p:cSld>
@@ -613,14 +606,6 @@
           <a:bodyPr/>
           <a:lstStyle/>
           <a:p>
-            <a:r>
-              <a:rPr lang="en-US" dirty="0" smtClean="0"/>
-              <a:t>There was a slide on Data Design which I removed because Zorro</a:t>
-            </a:r>
-            <a:r>
-              <a:rPr lang="en-US" baseline="0" dirty="0" smtClean="0"/>
-              <a:t> can explain the information on the slides using the picture here.</a:t>
-            </a:r>
             <a:endParaRPr lang="en-US" dirty="0"/>
           </a:p>
         </p:txBody>
@@ -642,7 +627,7 @@
           <a:p>
             <a:fld id="{1A6845E6-538C-49EA-A830-9072524FC492}" type="slidenum">
               <a:rPr lang="en-US" smtClean="0"/>
-              <a:t>14</a:t>
+              <a:t>9</a:t>
             </a:fld>
             <a:endParaRPr lang="en-US"/>
           </a:p>
@@ -651,7 +636,7 @@
     </p:spTree>
     <p:extLst>
       <p:ext uri="{BB962C8B-B14F-4D97-AF65-F5344CB8AC3E}">
-        <p14:creationId xmlns:p14="http://schemas.microsoft.com/office/powerpoint/2010/main" val="621821004"/>
+        <p14:creationId xmlns:p14="http://schemas.microsoft.com/office/powerpoint/2010/main" val="2705427681"/>
       </p:ext>
     </p:extLst>
   </p:cSld>
@@ -707,11 +692,11 @@
           <a:p>
             <a:r>
               <a:rPr lang="en-US" dirty="0" smtClean="0"/>
-              <a:t>Wade will present what he made using</a:t>
+              <a:t>There was a lot of information under each component</a:t>
             </a:r>
             <a:r>
               <a:rPr lang="en-US" baseline="0" dirty="0" smtClean="0"/>
-              <a:t> MWF at this point.</a:t>
+              <a:t> which I removed because Zorro or Zach could elaborate on them.</a:t>
             </a:r>
             <a:endParaRPr lang="en-US" dirty="0"/>
           </a:p>
@@ -734,7 +719,99 @@
           <a:p>
             <a:fld id="{1A6845E6-538C-49EA-A830-9072524FC492}" type="slidenum">
               <a:rPr lang="en-US" smtClean="0"/>
-              <a:t>15</a:t>
+              <a:t>12</a:t>
+            </a:fld>
+            <a:endParaRPr lang="en-US"/>
+          </a:p>
+        </p:txBody>
+      </p:sp>
+    </p:spTree>
+    <p:extLst>
+      <p:ext uri="{BB962C8B-B14F-4D97-AF65-F5344CB8AC3E}">
+        <p14:creationId xmlns:p14="http://schemas.microsoft.com/office/powerpoint/2010/main" val="1767483421"/>
+      </p:ext>
+    </p:extLst>
+  </p:cSld>
+  <p:clrMapOvr>
+    <a:masterClrMapping/>
+  </p:clrMapOvr>
+</p:notes>
+</file>
+
+<file path=ppt/notesSlides/notesSlide4.xml><?xml version="1.0" encoding="utf-8"?>
+<p:notes xmlns:a="http://schemas.openxmlformats.org/drawingml/2006/main" xmlns:r="http://schemas.openxmlformats.org/officeDocument/2006/relationships" xmlns:p="http://schemas.openxmlformats.org/presentationml/2006/main">
+  <p:cSld>
+    <p:spTree>
+      <p:nvGrpSpPr>
+        <p:cNvPr id="1" name=""/>
+        <p:cNvGrpSpPr/>
+        <p:nvPr/>
+      </p:nvGrpSpPr>
+      <p:grpSpPr>
+        <a:xfrm>
+          <a:off x="0" y="0"/>
+          <a:ext cx="0" cy="0"/>
+          <a:chOff x="0" y="0"/>
+          <a:chExt cx="0" cy="0"/>
+        </a:xfrm>
+      </p:grpSpPr>
+      <p:sp>
+        <p:nvSpPr>
+          <p:cNvPr id="2" name="Slide Image Placeholder 1"/>
+          <p:cNvSpPr>
+            <a:spLocks noGrp="1" noRot="1" noChangeAspect="1"/>
+          </p:cNvSpPr>
+          <p:nvPr>
+            <p:ph type="sldImg"/>
+          </p:nvPr>
+        </p:nvSpPr>
+        <p:spPr/>
+      </p:sp>
+      <p:sp>
+        <p:nvSpPr>
+          <p:cNvPr id="3" name="Notes Placeholder 2"/>
+          <p:cNvSpPr>
+            <a:spLocks noGrp="1"/>
+          </p:cNvSpPr>
+          <p:nvPr>
+            <p:ph type="body" idx="1"/>
+          </p:nvPr>
+        </p:nvSpPr>
+        <p:spPr/>
+        <p:txBody>
+          <a:bodyPr/>
+          <a:lstStyle/>
+          <a:p>
+            <a:r>
+              <a:rPr lang="en-US" dirty="0" smtClean="0"/>
+              <a:t>Wade will present what he made using</a:t>
+            </a:r>
+            <a:r>
+              <a:rPr lang="en-US" baseline="0" dirty="0" smtClean="0"/>
+              <a:t> MWF at this point.</a:t>
+            </a:r>
+            <a:endParaRPr lang="en-US" dirty="0"/>
+          </a:p>
+        </p:txBody>
+      </p:sp>
+      <p:sp>
+        <p:nvSpPr>
+          <p:cNvPr id="4" name="Slide Number Placeholder 3"/>
+          <p:cNvSpPr>
+            <a:spLocks noGrp="1"/>
+          </p:cNvSpPr>
+          <p:nvPr>
+            <p:ph type="sldNum" sz="quarter" idx="10"/>
+          </p:nvPr>
+        </p:nvSpPr>
+        <p:spPr/>
+        <p:txBody>
+          <a:bodyPr/>
+          <a:lstStyle/>
+          <a:p>
+            <a:fld id="{1A6845E6-538C-49EA-A830-9072524FC492}" type="slidenum">
+              <a:rPr lang="en-US" smtClean="0"/>
+              <a:t>19</a:t>
             </a:fld>
             <a:endParaRPr lang="en-US"/>
           </a:p>
@@ -2291,7 +2368,7 @@
           <a:p>
             <a:fld id="{B1B3241A-CC88-40CB-A269-FC6B849E1631}" type="datetimeFigureOut">
               <a:rPr lang="en-US" smtClean="0"/>
-              <a:t>11/4/11</a:t>
+              <a:t>11/7/11</a:t>
             </a:fld>
             <a:endParaRPr lang="en-US"/>
           </a:p>
@@ -3408,7 +3485,7 @@
           <a:p>
             <a:fld id="{B1B3241A-CC88-40CB-A269-FC6B849E1631}" type="datetimeFigureOut">
               <a:rPr lang="en-US" smtClean="0"/>
-              <a:t>11/4/11</a:t>
+              <a:t>11/7/11</a:t>
             </a:fld>
             <a:endParaRPr lang="en-US"/>
           </a:p>
@@ -4533,7 +4610,7 @@
           <a:p>
             <a:fld id="{B1B3241A-CC88-40CB-A269-FC6B849E1631}" type="datetimeFigureOut">
               <a:rPr lang="en-US" smtClean="0"/>
-              <a:t>11/4/11</a:t>
+              <a:t>11/7/11</a:t>
             </a:fld>
             <a:endParaRPr lang="en-US"/>
           </a:p>
@@ -5653,7 +5730,7 @@
           <a:p>
             <a:fld id="{B1B3241A-CC88-40CB-A269-FC6B849E1631}" type="datetimeFigureOut">
               <a:rPr lang="en-US" smtClean="0"/>
-              <a:t>11/4/11</a:t>
+              <a:t>11/7/11</a:t>
             </a:fld>
             <a:endParaRPr lang="en-US"/>
           </a:p>
@@ -7258,7 +7335,7 @@
           <a:p>
             <a:fld id="{B1B3241A-CC88-40CB-A269-FC6B849E1631}" type="datetimeFigureOut">
               <a:rPr lang="en-US" smtClean="0"/>
-              <a:t>11/4/11</a:t>
+              <a:t>11/7/11</a:t>
             </a:fld>
             <a:endParaRPr lang="en-US"/>
           </a:p>
@@ -8328,7 +8405,7 @@
           <a:p>
             <a:fld id="{B1B3241A-CC88-40CB-A269-FC6B849E1631}" type="datetimeFigureOut">
               <a:rPr lang="en-US" smtClean="0"/>
-              <a:t>11/4/11</a:t>
+              <a:t>11/7/11</a:t>
             </a:fld>
             <a:endParaRPr lang="en-US"/>
           </a:p>
@@ -9667,7 +9744,7 @@
           <a:p>
             <a:fld id="{B1B3241A-CC88-40CB-A269-FC6B849E1631}" type="datetimeFigureOut">
               <a:rPr lang="en-US" smtClean="0"/>
-              <a:t>11/4/11</a:t>
+              <a:t>11/7/11</a:t>
             </a:fld>
             <a:endParaRPr lang="en-US"/>
           </a:p>
@@ -10816,7 +10893,7 @@
           <a:p>
             <a:fld id="{B1B3241A-CC88-40CB-A269-FC6B849E1631}" type="datetimeFigureOut">
               <a:rPr lang="en-US" smtClean="0"/>
-              <a:t>11/4/11</a:t>
+              <a:t>11/7/11</a:t>
             </a:fld>
             <a:endParaRPr lang="en-US"/>
           </a:p>
@@ -11884,7 +11961,7 @@
           <a:p>
             <a:fld id="{B1B3241A-CC88-40CB-A269-FC6B849E1631}" type="datetimeFigureOut">
               <a:rPr lang="en-US" smtClean="0"/>
-              <a:t>11/4/11</a:t>
+              <a:t>11/7/11</a:t>
             </a:fld>
             <a:endParaRPr lang="en-US"/>
           </a:p>
@@ -12934,7 +13011,7 @@
           <a:p>
             <a:fld id="{B1B3241A-CC88-40CB-A269-FC6B849E1631}" type="datetimeFigureOut">
               <a:rPr lang="en-US" smtClean="0"/>
-              <a:t>11/4/11</a:t>
+              <a:t>11/7/11</a:t>
             </a:fld>
             <a:endParaRPr lang="en-US"/>
           </a:p>
@@ -14181,7 +14258,7 @@
           <a:p>
             <a:fld id="{B1B3241A-CC88-40CB-A269-FC6B849E1631}" type="datetimeFigureOut">
               <a:rPr lang="en-US" smtClean="0"/>
-              <a:t>11/4/11</a:t>
+              <a:t>11/7/11</a:t>
             </a:fld>
             <a:endParaRPr lang="en-US"/>
           </a:p>
@@ -14546,7 +14623,7 @@
           <a:p>
             <a:fld id="{B1B3241A-CC88-40CB-A269-FC6B849E1631}" type="datetimeFigureOut">
               <a:rPr lang="en-US" smtClean="0"/>
-              <a:t>11/4/11</a:t>
+              <a:t>11/7/11</a:t>
             </a:fld>
             <a:endParaRPr lang="en-US"/>
           </a:p>
@@ -15214,12 +15291,14 @@
         </p:nvSpPr>
         <p:spPr/>
         <p:txBody>
-          <a:bodyPr/>
+          <a:bodyPr>
+            <a:normAutofit fontScale="90000"/>
+          </a:bodyPr>
           <a:lstStyle/>
           <a:p>
             <a:r>
               <a:rPr lang="en-US" dirty="0" smtClean="0"/>
-              <a:t>Architectural Design</a:t>
+              <a:t>Architectural Design – Front End</a:t>
             </a:r>
             <a:endParaRPr lang="en-US" dirty="0"/>
           </a:p>
@@ -15238,7 +15317,7 @@
         <p:spPr/>
         <p:txBody>
           <a:bodyPr>
-            <a:normAutofit/>
+            <a:normAutofit fontScale="92500"/>
           </a:bodyPr>
           <a:lstStyle/>
           <a:p>
@@ -15256,21 +15335,18 @@
           </a:p>
           <a:p>
             <a:r>
-              <a:rPr lang="en-US" sz="2400" dirty="0" smtClean="0"/>
-              <a:t>In </a:t>
-            </a:r>
-            <a:r>
               <a:rPr lang="en-US" sz="2400" dirty="0"/>
-              <a:t>order to authenticate and authorize users, the server will contact Facebook and utilizing </a:t>
-            </a:r>
-            <a:r>
-              <a:rPr lang="en-US" sz="2400" dirty="0" err="1"/>
-              <a:t>OAuth</a:t>
-            </a:r>
+              <a:t>JavaScript utility component for generation of Mobile Web Framework Code based on data received from the back end.</a:t>
+            </a:r>
+          </a:p>
+          <a:p>
             <a:r>
               <a:rPr lang="en-US" sz="2400" dirty="0"/>
-              <a:t> 2.0 protocol will gain a privileged access token to be used for future requests. </a:t>
-            </a:r>
+              <a:t>JavaScript utility component for communication with the back end PHP code.</a:t>
+            </a:r>
+          </a:p>
+          <a:p>
+            <a:endParaRPr lang="en-US" sz="2400" dirty="0" smtClean="0"/>
           </a:p>
         </p:txBody>
       </p:sp>
@@ -15296,6 +15372,13 @@
       </p:transition>
     </mc:Fallback>
   </mc:AlternateContent>
+  <p:timing>
+    <p:tnLst>
+      <p:par>
+        <p:cTn xmlns:p14="http://schemas.microsoft.com/office/powerpoint/2010/main" id="1" dur="indefinite" restart="never" nodeType="tmRoot"/>
+      </p:par>
+    </p:tnLst>
+  </p:timing>
 </p:sld>
 </file>
 
@@ -15328,12 +15411,14 @@
         </p:nvSpPr>
         <p:spPr/>
         <p:txBody>
-          <a:bodyPr/>
+          <a:bodyPr>
+            <a:normAutofit fontScale="90000"/>
+          </a:bodyPr>
           <a:lstStyle/>
           <a:p>
             <a:r>
               <a:rPr lang="en-US" dirty="0" smtClean="0"/>
-              <a:t>Architectural Design (contd.)</a:t>
+              <a:t>Architectural Design – Server SIDE</a:t>
             </a:r>
             <a:endParaRPr lang="en-US" dirty="0"/>
           </a:p>
@@ -15369,59 +15454,6 @@
             <a:pPr lvl="1"/>
             <a:r>
               <a:rPr lang="en-US" sz="2000" dirty="0" smtClean="0"/>
-              <a:t>HTML </a:t>
-            </a:r>
-            <a:r>
-              <a:rPr lang="en-US" sz="2000" dirty="0"/>
-              <a:t>front </a:t>
-            </a:r>
-            <a:r>
-              <a:rPr lang="en-US" sz="2000" dirty="0" smtClean="0"/>
-              <a:t>end.</a:t>
-            </a:r>
-          </a:p>
-          <a:p>
-            <a:pPr lvl="1"/>
-            <a:r>
-              <a:rPr lang="en-US" sz="2000" dirty="0" smtClean="0"/>
-              <a:t>JavaScript </a:t>
-            </a:r>
-            <a:r>
-              <a:rPr lang="en-US" sz="2000" dirty="0"/>
-              <a:t>utility component for generation of Mobile </a:t>
-            </a:r>
-            <a:r>
-              <a:rPr lang="en-US" sz="2000" dirty="0" smtClean="0"/>
-              <a:t>Web Framework </a:t>
-            </a:r>
-            <a:r>
-              <a:rPr lang="en-US" sz="2000" dirty="0"/>
-              <a:t>Code based on data received from the back </a:t>
-            </a:r>
-            <a:r>
-              <a:rPr lang="en-US" sz="2000" dirty="0" smtClean="0"/>
-              <a:t>end.</a:t>
-            </a:r>
-          </a:p>
-          <a:p>
-            <a:pPr lvl="1"/>
-            <a:r>
-              <a:rPr lang="en-US" sz="2000" dirty="0" smtClean="0"/>
-              <a:t>JavaScript </a:t>
-            </a:r>
-            <a:r>
-              <a:rPr lang="en-US" sz="2000" dirty="0"/>
-              <a:t>utility component for communication with the back end PHP </a:t>
-            </a:r>
-            <a:r>
-              <a:rPr lang="en-US" sz="2000" dirty="0" smtClean="0"/>
-              <a:t>code.</a:t>
-            </a:r>
-          </a:p>
-          <a:p>
-            <a:pPr lvl="1"/>
-            <a:r>
-              <a:rPr lang="en-US" sz="2000" dirty="0" smtClean="0"/>
               <a:t>PHP </a:t>
             </a:r>
             <a:r>
@@ -15447,7 +15479,35 @@
               <a:rPr lang="en-US" sz="2000" dirty="0" smtClean="0"/>
               <a:t>.</a:t>
             </a:r>
-            <a:endParaRPr lang="en-US" sz="2000" dirty="0"/>
+          </a:p>
+          <a:p>
+            <a:r>
+              <a:rPr lang="en-US" sz="2400" dirty="0" smtClean="0"/>
+              <a:t>Using REST technology for API calls.</a:t>
+            </a:r>
+          </a:p>
+          <a:p>
+            <a:r>
+              <a:rPr lang="en-US" sz="2400" dirty="0" smtClean="0"/>
+              <a:t>Using Active Record paradigm for database access.</a:t>
+            </a:r>
+          </a:p>
+          <a:p>
+            <a:r>
+              <a:rPr lang="en-US" sz="2400" dirty="0"/>
+              <a:t>In order to authenticate and authorize users, the server will contact Facebook and utilizing </a:t>
+            </a:r>
+            <a:r>
+              <a:rPr lang="en-US" sz="2400" dirty="0" err="1"/>
+              <a:t>OAuth</a:t>
+            </a:r>
+            <a:r>
+              <a:rPr lang="en-US" sz="2400" dirty="0"/>
+              <a:t> 2.0 protocol will gain a privileged access token to be used for future requests. </a:t>
+            </a:r>
+          </a:p>
+          <a:p>
+            <a:endParaRPr lang="en-US" sz="2400" dirty="0"/>
           </a:p>
         </p:txBody>
       </p:sp>
@@ -15473,6 +15533,13 @@
       </p:transition>
     </mc:Fallback>
   </mc:AlternateContent>
+  <p:timing>
+    <p:tnLst>
+      <p:par>
+        <p:cTn xmlns:p14="http://schemas.microsoft.com/office/powerpoint/2010/main" id="1" dur="indefinite" restart="never" nodeType="tmRoot"/>
+      </p:par>
+    </p:tnLst>
+  </p:timing>
 </p:sld>
 </file>
 
@@ -15503,24 +15570,117 @@
             <p:ph type="title"/>
           </p:nvPr>
         </p:nvSpPr>
-        <p:spPr>
-          <a:xfrm>
-            <a:off x="228600" y="5715000"/>
-            <a:ext cx="7772400" cy="1143000"/>
-          </a:xfrm>
-        </p:spPr>
+        <p:spPr/>
         <p:txBody>
           <a:bodyPr/>
           <a:lstStyle/>
           <a:p>
             <a:r>
               <a:rPr lang="en-US" dirty="0" smtClean="0"/>
-              <a:t>Design Overview</a:t>
+              <a:t>Component Design</a:t>
             </a:r>
             <a:endParaRPr lang="en-US" dirty="0"/>
           </a:p>
         </p:txBody>
       </p:sp>
+      <p:sp>
+        <p:nvSpPr>
+          <p:cNvPr id="3" name="Content Placeholder 2"/>
+          <p:cNvSpPr>
+            <a:spLocks noGrp="1"/>
+          </p:cNvSpPr>
+          <p:nvPr>
+            <p:ph idx="1"/>
+          </p:nvPr>
+        </p:nvSpPr>
+        <p:spPr/>
+        <p:txBody>
+          <a:bodyPr>
+            <a:normAutofit/>
+          </a:bodyPr>
+          <a:lstStyle/>
+          <a:p>
+            <a:r>
+              <a:rPr lang="en-US" sz="2800" dirty="0" smtClean="0"/>
+              <a:t>HTML Component</a:t>
+            </a:r>
+          </a:p>
+          <a:p>
+            <a:r>
+              <a:rPr lang="en-US" sz="2800" dirty="0" smtClean="0"/>
+              <a:t>JavaScript MWF Component</a:t>
+            </a:r>
+          </a:p>
+          <a:p>
+            <a:r>
+              <a:rPr lang="en-US" sz="2800" dirty="0" smtClean="0"/>
+              <a:t>JavaScript Communication Component</a:t>
+            </a:r>
+          </a:p>
+          <a:p>
+            <a:r>
+              <a:rPr lang="en-US" sz="2800" dirty="0" smtClean="0"/>
+              <a:t>PHP Component</a:t>
+            </a:r>
+          </a:p>
+          <a:p>
+            <a:r>
+              <a:rPr lang="en-US" sz="2800" dirty="0" smtClean="0"/>
+              <a:t>Database Component</a:t>
+            </a:r>
+            <a:endParaRPr lang="en-US" sz="2800" dirty="0"/>
+          </a:p>
+        </p:txBody>
+      </p:sp>
+    </p:spTree>
+    <p:extLst>
+      <p:ext uri="{BB962C8B-B14F-4D97-AF65-F5344CB8AC3E}">
+        <p14:creationId xmlns:p14="http://schemas.microsoft.com/office/powerpoint/2010/main" val="2857799541"/>
+      </p:ext>
+    </p:extLst>
+  </p:cSld>
+  <p:clrMapOvr>
+    <a:masterClrMapping/>
+  </p:clrMapOvr>
+  <mc:AlternateContent xmlns:mc="http://schemas.openxmlformats.org/markup-compatibility/2006" xmlns:p14="http://schemas.microsoft.com/office/powerpoint/2010/main">
+    <mc:Choice Requires="p14">
+      <p:transition spd="slow" p14:dur="2000">
+        <p14:ferris dir="l"/>
+      </p:transition>
+    </mc:Choice>
+    <mc:Fallback xmlns="">
+      <p:transition spd="slow">
+        <p:fade/>
+      </p:transition>
+    </mc:Fallback>
+  </mc:AlternateContent>
+  <p:timing>
+    <p:tnLst>
+      <p:par>
+        <p:cTn xmlns:p14="http://schemas.microsoft.com/office/powerpoint/2010/main" id="1" dur="indefinite" restart="never" nodeType="tmRoot"/>
+      </p:par>
+    </p:tnLst>
+  </p:timing>
+</p:sld>
+</file>
+
+<file path=ppt/slides/slide13.xml><?xml version="1.0" encoding="utf-8"?>
+<p:sld xmlns:a="http://schemas.openxmlformats.org/drawingml/2006/main" xmlns:r="http://schemas.openxmlformats.org/officeDocument/2006/relationships" xmlns:p="http://schemas.openxmlformats.org/presentationml/2006/main">
+  <p:cSld>
+    <p:spTree>
+      <p:nvGrpSpPr>
+        <p:cNvPr id="1" name=""/>
+        <p:cNvGrpSpPr/>
+        <p:nvPr/>
+      </p:nvGrpSpPr>
+      <p:grpSpPr>
+        <a:xfrm>
+          <a:off x="0" y="0"/>
+          <a:ext cx="0" cy="0"/>
+          <a:chOff x="0" y="0"/>
+          <a:chExt cx="0" cy="0"/>
+        </a:xfrm>
+      </p:grpSpPr>
       <p:pic>
         <p:nvPicPr>
           <p:cNvPr id="4" name="Picture 2"/>
@@ -15546,8 +15706,8 @@
         </p:blipFill>
         <p:spPr bwMode="auto">
           <a:xfrm>
-            <a:off x="762000" y="457200"/>
-            <a:ext cx="7448152" cy="4724400"/>
+            <a:off x="1219200" y="1371600"/>
+            <a:ext cx="6400800" cy="4060059"/>
           </a:xfrm>
           <a:prstGeom prst="rect">
             <a:avLst/>
@@ -15587,6 +15747,29 @@
           </a:extLst>
         </p:spPr>
       </p:pic>
+      <p:sp>
+        <p:nvSpPr>
+          <p:cNvPr id="3" name="Title 2"/>
+          <p:cNvSpPr>
+            <a:spLocks noGrp="1"/>
+          </p:cNvSpPr>
+          <p:nvPr>
+            <p:ph type="title"/>
+          </p:nvPr>
+        </p:nvSpPr>
+        <p:spPr/>
+        <p:txBody>
+          <a:bodyPr/>
+          <a:lstStyle/>
+          <a:p>
+            <a:r>
+              <a:rPr lang="en-US" dirty="0" smtClean="0"/>
+              <a:t>Communications Overview</a:t>
+            </a:r>
+            <a:endParaRPr lang="en-US" dirty="0"/>
+          </a:p>
+        </p:txBody>
+      </p:sp>
     </p:spTree>
     <p:extLst>
       <p:ext uri="{BB962C8B-B14F-4D97-AF65-F5344CB8AC3E}">
@@ -15609,10 +15792,17 @@
       </p:transition>
     </mc:Fallback>
   </mc:AlternateContent>
+  <p:timing>
+    <p:tnLst>
+      <p:par>
+        <p:cTn xmlns:p14="http://schemas.microsoft.com/office/powerpoint/2010/main" id="1" dur="indefinite" restart="never" nodeType="tmRoot"/>
+      </p:par>
+    </p:tnLst>
+  </p:timing>
 </p:sld>
 </file>
 
-<file path=ppt/slides/slide13.xml><?xml version="1.0" encoding="utf-8"?>
+<file path=ppt/slides/slide14.xml><?xml version="1.0" encoding="utf-8"?>
 <p:sld xmlns:a="http://schemas.openxmlformats.org/drawingml/2006/main" xmlns:r="http://schemas.openxmlformats.org/officeDocument/2006/relationships" xmlns:p="http://schemas.openxmlformats.org/presentationml/2006/main">
   <p:cSld>
     <p:spTree>
@@ -15646,7 +15836,7 @@
           <a:p>
             <a:r>
               <a:rPr lang="en-US" dirty="0" smtClean="0"/>
-              <a:t>Component Design</a:t>
+              <a:t>Whoop-TXT API</a:t>
             </a:r>
             <a:endParaRPr lang="en-US" dirty="0"/>
           </a:p>
@@ -15670,41 +15860,94 @@
           <a:lstStyle/>
           <a:p>
             <a:r>
-              <a:rPr lang="en-US" sz="2800" dirty="0" smtClean="0"/>
-              <a:t>HTML Component</a:t>
-            </a:r>
-          </a:p>
-          <a:p>
-            <a:r>
-              <a:rPr lang="en-US" sz="2800" dirty="0" smtClean="0"/>
-              <a:t>JavaScript MWF Component</a:t>
-            </a:r>
-          </a:p>
-          <a:p>
-            <a:r>
-              <a:rPr lang="en-US" sz="2800" dirty="0" smtClean="0"/>
-              <a:t>JavaScript Communication Component</a:t>
-            </a:r>
-          </a:p>
-          <a:p>
-            <a:r>
-              <a:rPr lang="en-US" sz="2800" dirty="0" smtClean="0"/>
-              <a:t>PHP Component</a:t>
-            </a:r>
-          </a:p>
-          <a:p>
-            <a:r>
-              <a:rPr lang="en-US" sz="2800" dirty="0" smtClean="0"/>
-              <a:t>Database Component</a:t>
-            </a:r>
-            <a:endParaRPr lang="en-US" sz="2800" dirty="0"/>
+              <a:rPr lang="en-US" dirty="0" smtClean="0"/>
+              <a:t>API documentation on Wiki</a:t>
+            </a:r>
+          </a:p>
+          <a:p>
+            <a:r>
+              <a:rPr lang="en-US" dirty="0" smtClean="0"/>
+              <a:t>API Calls include:</a:t>
+            </a:r>
+          </a:p>
+          <a:p>
+            <a:pPr lvl="1"/>
+            <a:r>
+              <a:rPr lang="en-US" dirty="0" err="1" smtClean="0"/>
+              <a:t>say_hello</a:t>
+            </a:r>
+            <a:endParaRPr lang="en-US" dirty="0" smtClean="0"/>
+          </a:p>
+          <a:p>
+            <a:pPr lvl="1"/>
+            <a:r>
+              <a:rPr lang="en-US" dirty="0" err="1" smtClean="0"/>
+              <a:t>send_message</a:t>
+            </a:r>
+            <a:endParaRPr lang="en-US" dirty="0" smtClean="0"/>
+          </a:p>
+          <a:p>
+            <a:pPr lvl="1"/>
+            <a:r>
+              <a:rPr lang="en-US" dirty="0" err="1" smtClean="0"/>
+              <a:t>get_messages</a:t>
+            </a:r>
+            <a:endParaRPr lang="en-US" dirty="0" smtClean="0"/>
+          </a:p>
+          <a:p>
+            <a:pPr lvl="1"/>
+            <a:r>
+              <a:rPr lang="en-US" dirty="0" err="1" smtClean="0"/>
+              <a:t>mark_message</a:t>
+            </a:r>
+            <a:endParaRPr lang="en-US" dirty="0"/>
+          </a:p>
+          <a:p>
+            <a:pPr lvl="1"/>
+            <a:r>
+              <a:rPr lang="en-US" dirty="0" err="1" smtClean="0"/>
+              <a:t>create_token</a:t>
+            </a:r>
+            <a:endParaRPr lang="en-US" dirty="0" smtClean="0"/>
+          </a:p>
+          <a:p>
+            <a:pPr lvl="1"/>
+            <a:r>
+              <a:rPr lang="en-US" dirty="0" err="1" smtClean="0"/>
+              <a:t>get_tokens</a:t>
+            </a:r>
+            <a:endParaRPr lang="en-US" dirty="0" smtClean="0"/>
+          </a:p>
+          <a:p>
+            <a:pPr lvl="1"/>
+            <a:r>
+              <a:rPr lang="en-US" dirty="0" err="1" smtClean="0"/>
+              <a:t>invite_to_token</a:t>
+            </a:r>
+            <a:endParaRPr lang="en-US" dirty="0" smtClean="0"/>
+          </a:p>
+          <a:p>
+            <a:pPr lvl="1"/>
+            <a:r>
+              <a:rPr lang="en-US" dirty="0" err="1" smtClean="0"/>
+              <a:t>ignore_token</a:t>
+            </a:r>
+            <a:endParaRPr lang="en-US" dirty="0" smtClean="0"/>
+          </a:p>
+          <a:p>
+            <a:pPr lvl="1"/>
+            <a:endParaRPr lang="en-US" dirty="0" smtClean="0"/>
+          </a:p>
+          <a:p>
+            <a:pPr lvl="1"/>
+            <a:endParaRPr lang="en-US" dirty="0"/>
           </a:p>
         </p:txBody>
       </p:sp>
     </p:spTree>
     <p:extLst>
       <p:ext uri="{BB962C8B-B14F-4D97-AF65-F5344CB8AC3E}">
-        <p14:creationId xmlns:p14="http://schemas.microsoft.com/office/powerpoint/2010/main" val="2857799541"/>
+        <p14:creationId xmlns:p14="http://schemas.microsoft.com/office/powerpoint/2010/main" val="2323190142"/>
       </p:ext>
     </p:extLst>
   </p:cSld>
@@ -15723,142 +15966,13 @@
       </p:transition>
     </mc:Fallback>
   </mc:AlternateContent>
-</p:sld>
-</file>
-
-<file path=ppt/slides/slide14.xml><?xml version="1.0" encoding="utf-8"?>
-<p:sld xmlns:a="http://schemas.openxmlformats.org/drawingml/2006/main" xmlns:r="http://schemas.openxmlformats.org/officeDocument/2006/relationships" xmlns:p="http://schemas.openxmlformats.org/presentationml/2006/main">
-  <p:cSld>
-    <p:spTree>
-      <p:nvGrpSpPr>
-        <p:cNvPr id="1" name=""/>
-        <p:cNvGrpSpPr/>
-        <p:nvPr/>
-      </p:nvGrpSpPr>
-      <p:grpSpPr>
-        <a:xfrm>
-          <a:off x="0" y="0"/>
-          <a:ext cx="0" cy="0"/>
-          <a:chOff x="0" y="0"/>
-          <a:chExt cx="0" cy="0"/>
-        </a:xfrm>
-      </p:grpSpPr>
-      <p:sp>
-        <p:nvSpPr>
-          <p:cNvPr id="2" name="Title 1"/>
-          <p:cNvSpPr>
-            <a:spLocks noGrp="1"/>
-          </p:cNvSpPr>
-          <p:nvPr>
-            <p:ph type="title"/>
-          </p:nvPr>
-        </p:nvSpPr>
-        <p:spPr>
-          <a:xfrm>
-            <a:off x="381000" y="5715000"/>
-            <a:ext cx="7772400" cy="1143000"/>
-          </a:xfrm>
-        </p:spPr>
-        <p:txBody>
-          <a:bodyPr/>
-          <a:lstStyle/>
-          <a:p>
-            <a:r>
-              <a:rPr lang="en-US" dirty="0" smtClean="0"/>
-              <a:t>Data Design</a:t>
-            </a:r>
-            <a:endParaRPr lang="en-US" dirty="0"/>
-          </a:p>
-        </p:txBody>
-      </p:sp>
-      <p:pic>
-        <p:nvPicPr>
-          <p:cNvPr id="6" name="Picture 2"/>
-          <p:cNvPicPr>
-            <a:picLocks noGrp="1" noChangeAspect="1" noChangeArrowheads="1"/>
-          </p:cNvPicPr>
-          <p:nvPr>
-            <p:ph idx="1"/>
-          </p:nvPr>
-        </p:nvPicPr>
-        <p:blipFill>
-          <a:blip r:embed="rId3">
-            <a:extLst>
-              <a:ext uri="{28A0092B-C50C-407E-A947-70E740481C1C}">
-                <a14:useLocalDpi xmlns:a14="http://schemas.microsoft.com/office/drawing/2010/main" val="0"/>
-              </a:ext>
-            </a:extLst>
-          </a:blip>
-          <a:srcRect/>
-          <a:stretch>
-            <a:fillRect/>
-          </a:stretch>
-        </p:blipFill>
-        <p:spPr bwMode="auto">
-          <a:xfrm>
-            <a:off x="304799" y="990600"/>
-            <a:ext cx="8537945" cy="3352800"/>
-          </a:xfrm>
-          <a:prstGeom prst="rect">
-            <a:avLst/>
-          </a:prstGeom>
-          <a:noFill/>
-          <a:ln>
-            <a:noFill/>
-          </a:ln>
-          <a:effectLst/>
-          <a:extLst>
-            <a:ext uri="{909E8E84-426E-40dd-AFC4-6F175D3DCCD1}">
-              <a14:hiddenFill xmlns:a14="http://schemas.microsoft.com/office/drawing/2010/main">
-                <a:solidFill>
-                  <a:schemeClr val="accent1"/>
-                </a:solidFill>
-              </a14:hiddenFill>
-            </a:ext>
-            <a:ext uri="{91240B29-F687-4f45-9708-019B960494DF}">
-              <a14:hiddenLine xmlns:a14="http://schemas.microsoft.com/office/drawing/2010/main" w="9525">
-                <a:solidFill>
-                  <a:schemeClr val="tx1"/>
-                </a:solidFill>
-                <a:miter lim="800000"/>
-                <a:headEnd/>
-                <a:tailEnd/>
-              </a14:hiddenLine>
-            </a:ext>
-            <a:ext uri="{AF507438-7753-43e0-B8FC-AC1667EBCBE1}">
-              <a14:hiddenEffects xmlns:a14="http://schemas.microsoft.com/office/drawing/2010/main">
-                <a:effectLst>
-                  <a:outerShdw dist="35921" dir="2700000" algn="ctr" rotWithShape="0">
-                    <a:schemeClr val="bg2"/>
-                  </a:outerShdw>
-                </a:effectLst>
-              </a14:hiddenEffects>
-            </a:ext>
-          </a:extLst>
-        </p:spPr>
-      </p:pic>
-    </p:spTree>
-    <p:extLst>
-      <p:ext uri="{BB962C8B-B14F-4D97-AF65-F5344CB8AC3E}">
-        <p14:creationId xmlns:p14="http://schemas.microsoft.com/office/powerpoint/2010/main" val="2450915167"/>
-      </p:ext>
-    </p:extLst>
-  </p:cSld>
-  <p:clrMapOvr>
-    <a:masterClrMapping/>
-  </p:clrMapOvr>
-  <mc:AlternateContent xmlns:mc="http://schemas.openxmlformats.org/markup-compatibility/2006" xmlns:p14="http://schemas.microsoft.com/office/powerpoint/2010/main">
-    <mc:Choice Requires="p14">
-      <p:transition spd="slow" p14:dur="2000">
-        <p14:ferris dir="l"/>
-      </p:transition>
-    </mc:Choice>
-    <mc:Fallback xmlns="">
-      <p:transition spd="slow">
-        <p:fade/>
-      </p:transition>
-    </mc:Fallback>
-  </mc:AlternateContent>
+  <p:timing>
+    <p:tnLst>
+      <p:par>
+        <p:cTn xmlns:p14="http://schemas.microsoft.com/office/powerpoint/2010/main" id="1" dur="indefinite" restart="never" nodeType="tmRoot"/>
+      </p:par>
+    </p:tnLst>
+  </p:timing>
 </p:sld>
 </file>
 
@@ -15896,52 +16010,46 @@
           <a:p>
             <a:r>
               <a:rPr lang="en-US" dirty="0" smtClean="0"/>
-              <a:t>Prototype</a:t>
+              <a:t>Relational Database Structure</a:t>
             </a:r>
             <a:endParaRPr lang="en-US" dirty="0"/>
           </a:p>
         </p:txBody>
       </p:sp>
-      <p:sp>
-        <p:nvSpPr>
-          <p:cNvPr id="3" name="Content Placeholder 2"/>
-          <p:cNvSpPr>
-            <a:spLocks noGrp="1"/>
-          </p:cNvSpPr>
+      <p:pic>
+        <p:nvPicPr>
+          <p:cNvPr id="5" name="Content Placeholder 4" descr="Screen Shot 2011-11-04 at 1.02.04 PM.png"/>
+          <p:cNvPicPr>
+            <a:picLocks noGrp="1" noChangeAspect="1"/>
+          </p:cNvPicPr>
           <p:nvPr>
             <p:ph idx="1"/>
           </p:nvPr>
-        </p:nvSpPr>
-        <p:spPr/>
-        <p:txBody>
-          <a:bodyPr/>
-          <a:lstStyle/>
-          <a:p>
-            <a:r>
-              <a:rPr lang="en-US" sz="2800" dirty="0"/>
-              <a:t>http://whoop-txt.com/</a:t>
-            </a:r>
-          </a:p>
-          <a:p>
-            <a:r>
-              <a:rPr lang="en-US" sz="2800" dirty="0"/>
-              <a:t>Both desktop and smartphone </a:t>
-            </a:r>
-            <a:r>
-              <a:rPr lang="en-US" sz="2800" dirty="0" smtClean="0"/>
-              <a:t>demonstrations</a:t>
-            </a:r>
-            <a:endParaRPr lang="en-US" sz="2800" dirty="0"/>
-          </a:p>
-          <a:p>
-            <a:endParaRPr lang="en-US" dirty="0"/>
-          </a:p>
-        </p:txBody>
-      </p:sp>
+        </p:nvPicPr>
+        <p:blipFill>
+          <a:blip r:embed="rId2">
+            <a:extLst>
+              <a:ext uri="{28A0092B-C50C-407E-A947-70E740481C1C}">
+                <a14:useLocalDpi xmlns:a14="http://schemas.microsoft.com/office/drawing/2010/main" val="0"/>
+              </a:ext>
+            </a:extLst>
+          </a:blip>
+          <a:srcRect l="-13406" r="-13406"/>
+          <a:stretch>
+            <a:fillRect/>
+          </a:stretch>
+        </p:blipFill>
+        <p:spPr>
+          <a:xfrm>
+            <a:off x="-107300" y="1295400"/>
+            <a:ext cx="9358604" cy="4495800"/>
+          </a:xfrm>
+        </p:spPr>
+      </p:pic>
     </p:spTree>
     <p:extLst>
       <p:ext uri="{BB962C8B-B14F-4D97-AF65-F5344CB8AC3E}">
-        <p14:creationId xmlns:p14="http://schemas.microsoft.com/office/powerpoint/2010/main" val="2418521225"/>
+        <p14:creationId xmlns:p14="http://schemas.microsoft.com/office/powerpoint/2010/main" val="581599888"/>
       </p:ext>
     </p:extLst>
   </p:cSld>
@@ -15960,6 +16068,13 @@
       </p:transition>
     </mc:Fallback>
   </mc:AlternateContent>
+  <p:timing>
+    <p:tnLst>
+      <p:par>
+        <p:cTn xmlns:p14="http://schemas.microsoft.com/office/powerpoint/2010/main" id="1" dur="indefinite" restart="never" nodeType="tmRoot"/>
+      </p:par>
+    </p:tnLst>
+  </p:timing>
 </p:sld>
 </file>
 
@@ -16156,6 +16271,13 @@
       </p:transition>
     </mc:Fallback>
   </mc:AlternateContent>
+  <p:timing>
+    <p:tnLst>
+      <p:par>
+        <p:cTn xmlns:p14="http://schemas.microsoft.com/office/powerpoint/2010/main" id="1" dur="indefinite" restart="never" nodeType="tmRoot"/>
+      </p:par>
+    </p:tnLst>
+  </p:timing>
 </p:sld>
 </file>
 
@@ -16274,6 +16396,13 @@
       </p:transition>
     </mc:Fallback>
   </mc:AlternateContent>
+  <p:timing>
+    <p:tnLst>
+      <p:par>
+        <p:cTn xmlns:p14="http://schemas.microsoft.com/office/powerpoint/2010/main" id="1" dur="indefinite" restart="never" nodeType="tmRoot"/>
+      </p:par>
+    </p:tnLst>
+  </p:timing>
 </p:sld>
 </file>
 
@@ -16311,7 +16440,7 @@
           <a:p>
             <a:r>
               <a:rPr lang="en-US" dirty="0" smtClean="0"/>
-              <a:t>The End</a:t>
+              <a:t>Special Thanks to:</a:t>
             </a:r>
             <a:endParaRPr lang="en-US" dirty="0"/>
           </a:p>
@@ -16339,23 +16468,6 @@
           </a:bodyPr>
           <a:lstStyle/>
           <a:p>
-            <a:r>
-              <a:rPr lang="en-US" sz="2400" dirty="0"/>
-              <a:t>Thank you for listening</a:t>
-            </a:r>
-            <a:r>
-              <a:rPr lang="en-US" sz="2400" dirty="0" smtClean="0"/>
-              <a:t>! Any questions?</a:t>
-            </a:r>
-            <a:endParaRPr lang="en-US" sz="2400" dirty="0"/>
-          </a:p>
-          <a:p>
-            <a:r>
-              <a:rPr lang="en-US" sz="2400" dirty="0" smtClean="0"/>
-              <a:t>Special thanks to:</a:t>
-            </a:r>
-          </a:p>
-          <a:p>
             <a:pPr lvl="1"/>
             <a:r>
               <a:rPr lang="en-US" sz="1800" dirty="0" err="1" smtClean="0"/>
@@ -16376,57 +16488,57 @@
           <a:p>
             <a:pPr lvl="2"/>
             <a:r>
-              <a:rPr lang="en-US" sz="1600" dirty="0" smtClean="0"/>
+              <a:rPr lang="en-US" sz="1800" dirty="0" smtClean="0"/>
               <a:t>Chris </a:t>
             </a:r>
             <a:r>
-              <a:rPr lang="en-US" sz="1600" dirty="0" err="1" smtClean="0"/>
+              <a:rPr lang="en-US" sz="1800" dirty="0" err="1" smtClean="0"/>
               <a:t>Montalvo</a:t>
             </a:r>
-            <a:endParaRPr lang="en-US" sz="1600" dirty="0" smtClean="0"/>
+            <a:endParaRPr lang="en-US" sz="1800" dirty="0" smtClean="0"/>
           </a:p>
           <a:p>
             <a:pPr lvl="2"/>
             <a:r>
-              <a:rPr lang="en-US" sz="1600" dirty="0" smtClean="0"/>
+              <a:rPr lang="en-US" sz="1800" dirty="0" smtClean="0"/>
               <a:t>Dean </a:t>
             </a:r>
             <a:r>
-              <a:rPr lang="en-US" sz="1600" dirty="0" err="1" smtClean="0"/>
+              <a:rPr lang="en-US" sz="1800" dirty="0" err="1" smtClean="0"/>
               <a:t>Ocamura</a:t>
             </a:r>
-            <a:endParaRPr lang="en-US" sz="1600" dirty="0" smtClean="0"/>
+            <a:endParaRPr lang="en-US" sz="1800" dirty="0" smtClean="0"/>
           </a:p>
           <a:p>
             <a:pPr lvl="2"/>
             <a:r>
-              <a:rPr lang="en-US" sz="1600" dirty="0" smtClean="0"/>
+              <a:rPr lang="en-US" sz="1800" dirty="0" smtClean="0"/>
               <a:t>Michael Stein</a:t>
             </a:r>
           </a:p>
           <a:p>
             <a:pPr lvl="2"/>
             <a:r>
-              <a:rPr lang="en-US" sz="1600" dirty="0" smtClean="0"/>
+              <a:rPr lang="en-US" sz="1800" dirty="0" smtClean="0"/>
               <a:t>Neil </a:t>
             </a:r>
             <a:r>
-              <a:rPr lang="en-US" sz="1600" dirty="0" err="1" smtClean="0"/>
+              <a:rPr lang="en-US" sz="1800" dirty="0" err="1" smtClean="0"/>
               <a:t>Sahota</a:t>
             </a:r>
-            <a:endParaRPr lang="en-US" sz="1600" dirty="0" smtClean="0"/>
+            <a:endParaRPr lang="en-US" sz="1800" dirty="0" smtClean="0"/>
           </a:p>
           <a:p>
             <a:pPr lvl="2"/>
             <a:r>
-              <a:rPr lang="en-US" sz="1600" dirty="0" smtClean="0"/>
+              <a:rPr lang="en-US" sz="1800" dirty="0" smtClean="0"/>
               <a:t>Steve </a:t>
             </a:r>
             <a:r>
-              <a:rPr lang="en-US" sz="1600" dirty="0" err="1" smtClean="0"/>
+              <a:rPr lang="en-US" sz="1800" dirty="0" err="1" smtClean="0"/>
               <a:t>Havachi</a:t>
             </a:r>
-            <a:endParaRPr lang="en-US" sz="1600" dirty="0"/>
+            <a:endParaRPr lang="en-US" sz="1800" dirty="0"/>
           </a:p>
         </p:txBody>
       </p:sp>
@@ -16452,6 +16564,121 @@
       </p:transition>
     </mc:Fallback>
   </mc:AlternateContent>
+  <p:timing>
+    <p:tnLst>
+      <p:par>
+        <p:cTn xmlns:p14="http://schemas.microsoft.com/office/powerpoint/2010/main" id="1" dur="indefinite" restart="never" nodeType="tmRoot"/>
+      </p:par>
+    </p:tnLst>
+  </p:timing>
+</p:sld>
+</file>
+
+<file path=ppt/slides/slide19.xml><?xml version="1.0" encoding="utf-8"?>
+<p:sld xmlns:a="http://schemas.openxmlformats.org/drawingml/2006/main" xmlns:r="http://schemas.openxmlformats.org/officeDocument/2006/relationships" xmlns:p="http://schemas.openxmlformats.org/presentationml/2006/main">
+  <p:cSld>
+    <p:spTree>
+      <p:nvGrpSpPr>
+        <p:cNvPr id="1" name=""/>
+        <p:cNvGrpSpPr/>
+        <p:nvPr/>
+      </p:nvGrpSpPr>
+      <p:grpSpPr>
+        <a:xfrm>
+          <a:off x="0" y="0"/>
+          <a:ext cx="0" cy="0"/>
+          <a:chOff x="0" y="0"/>
+          <a:chExt cx="0" cy="0"/>
+        </a:xfrm>
+      </p:grpSpPr>
+      <p:sp>
+        <p:nvSpPr>
+          <p:cNvPr id="2" name="Title 1"/>
+          <p:cNvSpPr>
+            <a:spLocks noGrp="1"/>
+          </p:cNvSpPr>
+          <p:nvPr>
+            <p:ph type="title"/>
+          </p:nvPr>
+        </p:nvSpPr>
+        <p:spPr/>
+        <p:txBody>
+          <a:bodyPr/>
+          <a:lstStyle/>
+          <a:p>
+            <a:r>
+              <a:rPr lang="en-US" dirty="0" smtClean="0"/>
+              <a:t>Prototype</a:t>
+            </a:r>
+            <a:endParaRPr lang="en-US" dirty="0"/>
+          </a:p>
+        </p:txBody>
+      </p:sp>
+      <p:sp>
+        <p:nvSpPr>
+          <p:cNvPr id="3" name="Content Placeholder 2"/>
+          <p:cNvSpPr>
+            <a:spLocks noGrp="1"/>
+          </p:cNvSpPr>
+          <p:nvPr>
+            <p:ph idx="1"/>
+          </p:nvPr>
+        </p:nvSpPr>
+        <p:spPr/>
+        <p:txBody>
+          <a:bodyPr/>
+          <a:lstStyle/>
+          <a:p>
+            <a:r>
+              <a:rPr lang="en-US" sz="2800" dirty="0"/>
+              <a:t>http://whoop-txt.com/</a:t>
+            </a:r>
+          </a:p>
+          <a:p>
+            <a:r>
+              <a:rPr lang="en-US" sz="2800" dirty="0"/>
+              <a:t>Both desktop and smartphone </a:t>
+            </a:r>
+            <a:r>
+              <a:rPr lang="en-US" sz="2800" dirty="0" smtClean="0"/>
+              <a:t>demonstrations</a:t>
+            </a:r>
+            <a:endParaRPr lang="en-US" sz="2800" dirty="0"/>
+          </a:p>
+          <a:p>
+            <a:endParaRPr lang="en-US" dirty="0"/>
+          </a:p>
+        </p:txBody>
+      </p:sp>
+    </p:spTree>
+    <p:extLst>
+      <p:ext uri="{BB962C8B-B14F-4D97-AF65-F5344CB8AC3E}">
+        <p14:creationId xmlns:p14="http://schemas.microsoft.com/office/powerpoint/2010/main" val="2418521225"/>
+      </p:ext>
+    </p:extLst>
+  </p:cSld>
+  <p:clrMapOvr>
+    <a:masterClrMapping/>
+  </p:clrMapOvr>
+  <mc:AlternateContent xmlns:mc="http://schemas.openxmlformats.org/markup-compatibility/2006" xmlns:p14="http://schemas.microsoft.com/office/powerpoint/2010/main">
+    <mc:Choice Requires="p14">
+      <p:transition spd="slow" p14:dur="2000">
+        <p14:ferris dir="l"/>
+      </p:transition>
+    </mc:Choice>
+    <mc:Fallback xmlns="">
+      <p:transition spd="slow">
+        <p:fade/>
+      </p:transition>
+    </mc:Fallback>
+  </mc:AlternateContent>
+  <p:timing>
+    <p:tnLst>
+      <p:par>
+        <p:cTn xmlns:p14="http://schemas.microsoft.com/office/powerpoint/2010/main" id="1" dur="indefinite" restart="never" nodeType="tmRoot"/>
+      </p:par>
+    </p:tnLst>
+  </p:timing>
 </p:sld>
 </file>
 
@@ -17236,7 +17463,7 @@
       </p:sp>
       <p:sp>
         <p:nvSpPr>
-          <p:cNvPr id="3" name="Content Placeholder 2"/>
+          <p:cNvPr id="4" name="Content Placeholder 3"/>
           <p:cNvSpPr>
             <a:spLocks noGrp="1"/>
           </p:cNvSpPr>
@@ -17244,10 +17471,15 @@
             <p:ph idx="1"/>
           </p:nvPr>
         </p:nvSpPr>
-        <p:spPr/>
+        <p:spPr>
+          <a:xfrm>
+            <a:off x="685800" y="1600201"/>
+            <a:ext cx="5257800" cy="3733800"/>
+          </a:xfrm>
+        </p:spPr>
         <p:txBody>
           <a:bodyPr>
-            <a:normAutofit lnSpcReduction="10000"/>
+            <a:normAutofit fontScale="92500" lnSpcReduction="10000"/>
           </a:bodyPr>
           <a:lstStyle/>
           <a:p>
@@ -17292,26 +17524,16 @@
           <a:p>
             <a:pPr lvl="2"/>
             <a:r>
-              <a:rPr lang="en-US" dirty="0" smtClean="0"/>
+              <a:rPr lang="en-US" dirty="0"/>
               <a:t>Whoop It- Takes you to the Write Message Page.</a:t>
             </a:r>
-            <a:endParaRPr lang="en-US" dirty="0"/>
           </a:p>
           <a:p>
             <a:pPr lvl="2"/>
             <a:r>
-              <a:rPr lang="en-US" dirty="0" smtClean="0"/>
-              <a:t>Messages </a:t>
-            </a:r>
-            <a:r>
               <a:rPr lang="en-US" dirty="0"/>
-              <a:t>- Directs you to </a:t>
-            </a:r>
-            <a:r>
-              <a:rPr lang="en-US" dirty="0" smtClean="0"/>
-              <a:t>the Message Stream Page.</a:t>
-            </a:r>
-            <a:endParaRPr lang="en-US" dirty="0"/>
+              <a:t>Messages - Directs you to the Message Stream Page.</a:t>
+            </a:r>
           </a:p>
           <a:p>
             <a:pPr lvl="2"/>
@@ -17319,14 +17541,163 @@
               <a:rPr lang="en-US" dirty="0"/>
               <a:t>Groups - Directs you to the Groups Page. </a:t>
             </a:r>
-            <a:endParaRPr lang="en-US" dirty="0" smtClean="0"/>
           </a:p>
           <a:p>
             <a:pPr lvl="2"/>
             <a:r>
-              <a:rPr lang="en-US" dirty="0" smtClean="0"/>
-              <a:t>Invitations – Directs you to Invitations Page.</a:t>
-            </a:r>
+              <a:rPr lang="en-US" dirty="0"/>
+              <a:t>Invitations – Directs you to the Invitations Page.</a:t>
+            </a:r>
+          </a:p>
+          <a:p>
+            <a:endParaRPr lang="en-US" dirty="0"/>
+          </a:p>
+        </p:txBody>
+      </p:sp>
+      <p:pic>
+        <p:nvPicPr>
+          <p:cNvPr id="5" name="Picture 4" descr="Screen Shot 2011-11-04 at 1.03.12 PM.png"/>
+          <p:cNvPicPr>
+            <a:picLocks noChangeAspect="1"/>
+          </p:cNvPicPr>
+          <p:nvPr/>
+        </p:nvPicPr>
+        <p:blipFill>
+          <a:blip r:embed="rId3">
+            <a:extLst>
+              <a:ext uri="{28A0092B-C50C-407E-A947-70E740481C1C}">
+                <a14:useLocalDpi xmlns:a14="http://schemas.microsoft.com/office/drawing/2010/main" val="0"/>
+              </a:ext>
+            </a:extLst>
+          </a:blip>
+          <a:stretch>
+            <a:fillRect/>
+          </a:stretch>
+        </p:blipFill>
+        <p:spPr>
+          <a:xfrm>
+            <a:off x="6019800" y="2667000"/>
+            <a:ext cx="2362200" cy="2971800"/>
+          </a:xfrm>
+          <a:prstGeom prst="rect">
+            <a:avLst/>
+          </a:prstGeom>
+        </p:spPr>
+      </p:pic>
+      <p:pic>
+        <p:nvPicPr>
+          <p:cNvPr id="6" name="Picture 5"/>
+          <p:cNvPicPr>
+            <a:picLocks noChangeAspect="1" noChangeArrowheads="1"/>
+          </p:cNvPicPr>
+          <p:nvPr/>
+        </p:nvPicPr>
+        <p:blipFill rotWithShape="1">
+          <a:blip r:embed="rId4">
+            <a:extLst>
+              <a:ext uri="{28A0092B-C50C-407E-A947-70E740481C1C}">
+                <a14:useLocalDpi xmlns:a14="http://schemas.microsoft.com/office/drawing/2010/main" val="0"/>
+              </a:ext>
+            </a:extLst>
+          </a:blip>
+          <a:srcRect l="3807" t="22178" r="4450" b="52106"/>
+          <a:stretch/>
+        </p:blipFill>
+        <p:spPr bwMode="auto">
+          <a:xfrm>
+            <a:off x="6019800" y="1295400"/>
+            <a:ext cx="2362200" cy="1027729"/>
+          </a:xfrm>
+          <a:prstGeom prst="rect">
+            <a:avLst/>
+          </a:prstGeom>
+          <a:noFill/>
+          <a:ln>
+            <a:noFill/>
+          </a:ln>
+          <a:effectLst/>
+          <a:extLst>
+            <a:ext uri="{909E8E84-426E-40dd-AFC4-6F175D3DCCD1}">
+              <a14:hiddenFill xmlns:a14="http://schemas.microsoft.com/office/drawing/2010/main">
+                <a:solidFill>
+                  <a:schemeClr val="accent1"/>
+                </a:solidFill>
+              </a14:hiddenFill>
+            </a:ext>
+            <a:ext uri="{91240B29-F687-4f45-9708-019B960494DF}">
+              <a14:hiddenLine xmlns:a14="http://schemas.microsoft.com/office/drawing/2010/main" w="9525">
+                <a:solidFill>
+                  <a:schemeClr val="tx1"/>
+                </a:solidFill>
+                <a:miter lim="800000"/>
+                <a:headEnd/>
+                <a:tailEnd/>
+              </a14:hiddenLine>
+            </a:ext>
+            <a:ext uri="{AF507438-7753-43e0-B8FC-AC1667EBCBE1}">
+              <a14:hiddenEffects xmlns:a14="http://schemas.microsoft.com/office/drawing/2010/main">
+                <a:effectLst>
+                  <a:outerShdw dist="35921" dir="2700000" algn="ctr" rotWithShape="0">
+                    <a:schemeClr val="bg2"/>
+                  </a:outerShdw>
+                </a:effectLst>
+              </a14:hiddenEffects>
+            </a:ext>
+          </a:extLst>
+        </p:spPr>
+      </p:pic>
+      <p:sp>
+        <p:nvSpPr>
+          <p:cNvPr id="7" name="TextBox 6"/>
+          <p:cNvSpPr txBox="1"/>
+          <p:nvPr/>
+        </p:nvSpPr>
+        <p:spPr>
+          <a:xfrm>
+            <a:off x="5992917" y="2667000"/>
+            <a:ext cx="941283" cy="276999"/>
+          </a:xfrm>
+          <a:prstGeom prst="rect">
+            <a:avLst/>
+          </a:prstGeom>
+          <a:noFill/>
+        </p:spPr>
+        <p:txBody>
+          <a:bodyPr wrap="none" rtlCol="0">
+            <a:spAutoFit/>
+          </a:bodyPr>
+          <a:lstStyle/>
+          <a:p>
+            <a:r>
+              <a:rPr lang="en-US" sz="1200" dirty="0" smtClean="0"/>
+              <a:t>Whoop-Txt</a:t>
+            </a:r>
+            <a:endParaRPr lang="en-US" sz="1200" dirty="0"/>
+          </a:p>
+        </p:txBody>
+      </p:sp>
+      <p:sp>
+        <p:nvSpPr>
+          <p:cNvPr id="8" name="TextBox 7"/>
+          <p:cNvSpPr txBox="1"/>
+          <p:nvPr/>
+        </p:nvSpPr>
+        <p:spPr>
+          <a:xfrm>
+            <a:off x="5163081" y="5849041"/>
+            <a:ext cx="184666" cy="369332"/>
+          </a:xfrm>
+          <a:prstGeom prst="rect">
+            <a:avLst/>
+          </a:prstGeom>
+          <a:noFill/>
+        </p:spPr>
+        <p:txBody>
+          <a:bodyPr wrap="none" rtlCol="0">
+            <a:spAutoFit/>
+          </a:bodyPr>
+          <a:lstStyle/>
+          <a:p>
             <a:endParaRPr lang="en-US" dirty="0"/>
           </a:p>
         </p:txBody>
@@ -17390,12 +17761,7 @@
             <p:ph type="title"/>
           </p:nvPr>
         </p:nvSpPr>
-        <p:spPr>
-          <a:xfrm>
-            <a:off x="685800" y="152400"/>
-            <a:ext cx="7772400" cy="1143000"/>
-          </a:xfrm>
-        </p:spPr>
+        <p:spPr/>
         <p:txBody>
           <a:bodyPr/>
           <a:lstStyle/>
@@ -17418,45 +17784,26 @@
             <p:ph idx="1"/>
           </p:nvPr>
         </p:nvSpPr>
-        <p:spPr>
-          <a:xfrm>
-            <a:off x="685800" y="1371600"/>
-            <a:ext cx="7772400" cy="3733800"/>
-          </a:xfrm>
-        </p:spPr>
+        <p:spPr/>
         <p:txBody>
-          <a:bodyPr>
-            <a:normAutofit/>
-          </a:bodyPr>
+          <a:bodyPr/>
           <a:lstStyle/>
           <a:p>
             <a:r>
-              <a:rPr lang="en-US" dirty="0" smtClean="0"/>
-              <a:t>Whoop It </a:t>
-            </a:r>
-            <a:r>
               <a:rPr lang="en-US" dirty="0"/>
-              <a:t>page</a:t>
+              <a:t>Whoop It page</a:t>
             </a:r>
           </a:p>
           <a:p>
             <a:pPr lvl="1"/>
             <a:r>
               <a:rPr lang="en-US" dirty="0"/>
-              <a:t>Allows you to </a:t>
-            </a:r>
-            <a:r>
-              <a:rPr lang="en-US" dirty="0" smtClean="0"/>
-              <a:t>share posts </a:t>
-            </a:r>
+              <a:t>Allows you to share posts to other Whoop-Txt users. The user will have the choice of explicitly selecting “tags” that will modify who will be able to see or be notified of this post or they can text people a certain distance away from them. </a:t>
+            </a:r>
+          </a:p>
+          <a:p>
             <a:r>
               <a:rPr lang="en-US" dirty="0"/>
-              <a:t>to other Whoop-Txt users. The user will have the choice of explicitly selecting “tags” that will modify who will be able to see or be notified of this post or they can text people a certain distance away from them. </a:t>
-            </a:r>
-          </a:p>
-          <a:p>
-            <a:r>
-              <a:rPr lang="en-US" dirty="0" smtClean="0"/>
               <a:t>Groups page</a:t>
             </a:r>
           </a:p>
@@ -17466,20 +17813,33 @@
               <a:rPr lang="en-US" sz="1600" dirty="0"/>
               <a:t>Lists all the groups the user is a part of, whether it is one they have created or have been added to. Users will be able to create custom groups and view members within the groups. </a:t>
             </a:r>
-            <a:endParaRPr lang="en-US" sz="1600" dirty="0" smtClean="0"/>
-          </a:p>
-          <a:p>
-            <a:r>
-              <a:rPr lang="en-US" dirty="0" smtClean="0"/>
+          </a:p>
+          <a:p>
+            <a:r>
+              <a:rPr lang="en-US" dirty="0"/>
               <a:t>Invitations</a:t>
             </a:r>
           </a:p>
           <a:p>
             <a:pPr lvl="1"/>
             <a:r>
-              <a:rPr lang="en-US" dirty="0" smtClean="0"/>
+              <a:rPr lang="en-US" dirty="0"/>
               <a:t>View your pending requests to join other groups</a:t>
             </a:r>
+          </a:p>
+          <a:p>
+            <a:r>
+              <a:rPr lang="en-US" dirty="0"/>
+              <a:t>Help and View Full Site</a:t>
+            </a:r>
+          </a:p>
+          <a:p>
+            <a:pPr lvl="1"/>
+            <a:endParaRPr lang="en-US" dirty="0"/>
+          </a:p>
+          <a:p>
+            <a:pPr lvl="1"/>
+            <a:endParaRPr lang="en-US" dirty="0"/>
           </a:p>
           <a:p>
             <a:pPr lvl="1"/>
@@ -17538,7 +17898,7 @@
       </p:grpSpPr>
       <p:sp>
         <p:nvSpPr>
-          <p:cNvPr id="2" name="Title 1"/>
+          <p:cNvPr id="5" name="Title 4"/>
           <p:cNvSpPr>
             <a:spLocks noGrp="1"/>
           </p:cNvSpPr>
@@ -17548,7 +17908,7 @@
         </p:nvSpPr>
         <p:spPr>
           <a:xfrm>
-            <a:off x="304800" y="5715000"/>
+            <a:off x="609600" y="0"/>
             <a:ext cx="7772400" cy="1143000"/>
           </a:xfrm>
         </p:spPr>
@@ -17557,25 +17917,22 @@
           <a:lstStyle/>
           <a:p>
             <a:r>
-              <a:rPr lang="en-US" dirty="0" smtClean="0"/>
+              <a:rPr lang="en-US" dirty="0"/>
               <a:t>Interface Design</a:t>
             </a:r>
-            <a:endParaRPr lang="en-US" dirty="0"/>
           </a:p>
         </p:txBody>
       </p:sp>
       <p:pic>
         <p:nvPicPr>
-          <p:cNvPr id="5" name="Content Placeholder 4" descr="specs1.jpg"/>
+          <p:cNvPr id="6" name="Content Placeholder 4" descr="specs1.jpg"/>
           <p:cNvPicPr>
-            <a:picLocks noGrp="1" noChangeAspect="1"/>
+            <a:picLocks noChangeAspect="1"/>
           </p:cNvPicPr>
-          <p:nvPr>
-            <p:ph idx="1"/>
-          </p:nvPr>
+          <p:nvPr/>
         </p:nvPicPr>
         <p:blipFill>
-          <a:blip r:embed="rId2">
+          <a:blip r:embed="rId3">
             <a:extLst>
               <a:ext uri="{28A0092B-C50C-407E-A947-70E740481C1C}">
                 <a14:useLocalDpi xmlns:a14="http://schemas.microsoft.com/office/drawing/2010/main" val="0"/>
@@ -17589,9 +17946,12 @@
         </p:blipFill>
         <p:spPr>
           <a:xfrm>
-            <a:off x="685800" y="228599"/>
-            <a:ext cx="7772400" cy="5181601"/>
+            <a:off x="762000" y="914399"/>
+            <a:ext cx="7086600" cy="4724401"/>
           </a:xfrm>
+          <a:prstGeom prst="rect">
+            <a:avLst/>
+          </a:prstGeom>
         </p:spPr>
       </p:pic>
     </p:spTree>

</xml_diff>

<commit_message>
Uploaded the latest version of the midterm-presentation.pptx.
</commit_message>
<xml_diff>
--- a/doc/midterm_presentation.pptx
+++ b/doc/midterm_presentation.pptx
@@ -23,10 +23,10 @@
     <p:sldId id="267" r:id="rId14"/>
     <p:sldId id="274" r:id="rId15"/>
     <p:sldId id="275" r:id="rId16"/>
-    <p:sldId id="271" r:id="rId17"/>
-    <p:sldId id="272" r:id="rId18"/>
-    <p:sldId id="273" r:id="rId19"/>
-    <p:sldId id="270" r:id="rId20"/>
+    <p:sldId id="270" r:id="rId17"/>
+    <p:sldId id="271" r:id="rId18"/>
+    <p:sldId id="272" r:id="rId19"/>
+    <p:sldId id="273" r:id="rId20"/>
   </p:sldIdLst>
   <p:sldSz cx="9144000" cy="6858000" type="screen4x3"/>
   <p:notesSz cx="6858000" cy="9144000"/>
@@ -210,7 +210,7 @@
           <a:p>
             <a:fld id="{B02F4689-6D44-45C5-936E-453627548D96}" type="datetimeFigureOut">
               <a:rPr lang="en-US" smtClean="0"/>
-              <a:t>11/7/11</a:t>
+              <a:t>11/4/2011</a:t>
             </a:fld>
             <a:endParaRPr lang="en-US"/>
           </a:p>
@@ -522,6 +522,14 @@
           <a:bodyPr/>
           <a:lstStyle/>
           <a:p>
+            <a:r>
+              <a:rPr lang="en-US" dirty="0" smtClean="0"/>
+              <a:t>There was a lot of information under each component</a:t>
+            </a:r>
+            <a:r>
+              <a:rPr lang="en-US" baseline="0" dirty="0" smtClean="0"/>
+              <a:t> which I removed because Zorro or Zach could elaborate on them.</a:t>
+            </a:r>
             <a:endParaRPr lang="en-US" dirty="0"/>
           </a:p>
         </p:txBody>
@@ -543,7 +551,7 @@
           <a:p>
             <a:fld id="{1A6845E6-538C-49EA-A830-9072524FC492}" type="slidenum">
               <a:rPr lang="en-US" smtClean="0"/>
-              <a:t>7</a:t>
+              <a:t>12</a:t>
             </a:fld>
             <a:endParaRPr lang="en-US"/>
           </a:p>
@@ -552,7 +560,7 @@
     </p:spTree>
     <p:extLst>
       <p:ext uri="{BB962C8B-B14F-4D97-AF65-F5344CB8AC3E}">
-        <p14:creationId xmlns:p14="http://schemas.microsoft.com/office/powerpoint/2010/main" val="823327097"/>
+        <p14:creationId xmlns:p14="http://schemas.microsoft.com/office/powerpoint/2010/main" val="1767483421"/>
       </p:ext>
     </p:extLst>
   </p:cSld>
@@ -606,6 +614,14 @@
           <a:bodyPr/>
           <a:lstStyle/>
           <a:p>
+            <a:r>
+              <a:rPr lang="en-US" dirty="0" smtClean="0"/>
+              <a:t>Wade will present what he made using</a:t>
+            </a:r>
+            <a:r>
+              <a:rPr lang="en-US" baseline="0" dirty="0" smtClean="0"/>
+              <a:t> MWF at this point.</a:t>
+            </a:r>
             <a:endParaRPr lang="en-US" dirty="0"/>
           </a:p>
         </p:txBody>
@@ -627,191 +643,7 @@
           <a:p>
             <a:fld id="{1A6845E6-538C-49EA-A830-9072524FC492}" type="slidenum">
               <a:rPr lang="en-US" smtClean="0"/>
-              <a:t>9</a:t>
-            </a:fld>
-            <a:endParaRPr lang="en-US"/>
-          </a:p>
-        </p:txBody>
-      </p:sp>
-    </p:spTree>
-    <p:extLst>
-      <p:ext uri="{BB962C8B-B14F-4D97-AF65-F5344CB8AC3E}">
-        <p14:creationId xmlns:p14="http://schemas.microsoft.com/office/powerpoint/2010/main" val="2705427681"/>
-      </p:ext>
-    </p:extLst>
-  </p:cSld>
-  <p:clrMapOvr>
-    <a:masterClrMapping/>
-  </p:clrMapOvr>
-</p:notes>
-</file>
-
-<file path=ppt/notesSlides/notesSlide3.xml><?xml version="1.0" encoding="utf-8"?>
-<p:notes xmlns:a="http://schemas.openxmlformats.org/drawingml/2006/main" xmlns:r="http://schemas.openxmlformats.org/officeDocument/2006/relationships" xmlns:p="http://schemas.openxmlformats.org/presentationml/2006/main">
-  <p:cSld>
-    <p:spTree>
-      <p:nvGrpSpPr>
-        <p:cNvPr id="1" name=""/>
-        <p:cNvGrpSpPr/>
-        <p:nvPr/>
-      </p:nvGrpSpPr>
-      <p:grpSpPr>
-        <a:xfrm>
-          <a:off x="0" y="0"/>
-          <a:ext cx="0" cy="0"/>
-          <a:chOff x="0" y="0"/>
-          <a:chExt cx="0" cy="0"/>
-        </a:xfrm>
-      </p:grpSpPr>
-      <p:sp>
-        <p:nvSpPr>
-          <p:cNvPr id="2" name="Slide Image Placeholder 1"/>
-          <p:cNvSpPr>
-            <a:spLocks noGrp="1" noRot="1" noChangeAspect="1"/>
-          </p:cNvSpPr>
-          <p:nvPr>
-            <p:ph type="sldImg"/>
-          </p:nvPr>
-        </p:nvSpPr>
-        <p:spPr/>
-      </p:sp>
-      <p:sp>
-        <p:nvSpPr>
-          <p:cNvPr id="3" name="Notes Placeholder 2"/>
-          <p:cNvSpPr>
-            <a:spLocks noGrp="1"/>
-          </p:cNvSpPr>
-          <p:nvPr>
-            <p:ph type="body" idx="1"/>
-          </p:nvPr>
-        </p:nvSpPr>
-        <p:spPr/>
-        <p:txBody>
-          <a:bodyPr/>
-          <a:lstStyle/>
-          <a:p>
-            <a:r>
-              <a:rPr lang="en-US" dirty="0" smtClean="0"/>
-              <a:t>There was a lot of information under each component</a:t>
-            </a:r>
-            <a:r>
-              <a:rPr lang="en-US" baseline="0" dirty="0" smtClean="0"/>
-              <a:t> which I removed because Zorro or Zach could elaborate on them.</a:t>
-            </a:r>
-            <a:endParaRPr lang="en-US" dirty="0"/>
-          </a:p>
-        </p:txBody>
-      </p:sp>
-      <p:sp>
-        <p:nvSpPr>
-          <p:cNvPr id="4" name="Slide Number Placeholder 3"/>
-          <p:cNvSpPr>
-            <a:spLocks noGrp="1"/>
-          </p:cNvSpPr>
-          <p:nvPr>
-            <p:ph type="sldNum" sz="quarter" idx="10"/>
-          </p:nvPr>
-        </p:nvSpPr>
-        <p:spPr/>
-        <p:txBody>
-          <a:bodyPr/>
-          <a:lstStyle/>
-          <a:p>
-            <a:fld id="{1A6845E6-538C-49EA-A830-9072524FC492}" type="slidenum">
-              <a:rPr lang="en-US" smtClean="0"/>
-              <a:t>12</a:t>
-            </a:fld>
-            <a:endParaRPr lang="en-US"/>
-          </a:p>
-        </p:txBody>
-      </p:sp>
-    </p:spTree>
-    <p:extLst>
-      <p:ext uri="{BB962C8B-B14F-4D97-AF65-F5344CB8AC3E}">
-        <p14:creationId xmlns:p14="http://schemas.microsoft.com/office/powerpoint/2010/main" val="1767483421"/>
-      </p:ext>
-    </p:extLst>
-  </p:cSld>
-  <p:clrMapOvr>
-    <a:masterClrMapping/>
-  </p:clrMapOvr>
-</p:notes>
-</file>
-
-<file path=ppt/notesSlides/notesSlide4.xml><?xml version="1.0" encoding="utf-8"?>
-<p:notes xmlns:a="http://schemas.openxmlformats.org/drawingml/2006/main" xmlns:r="http://schemas.openxmlformats.org/officeDocument/2006/relationships" xmlns:p="http://schemas.openxmlformats.org/presentationml/2006/main">
-  <p:cSld>
-    <p:spTree>
-      <p:nvGrpSpPr>
-        <p:cNvPr id="1" name=""/>
-        <p:cNvGrpSpPr/>
-        <p:nvPr/>
-      </p:nvGrpSpPr>
-      <p:grpSpPr>
-        <a:xfrm>
-          <a:off x="0" y="0"/>
-          <a:ext cx="0" cy="0"/>
-          <a:chOff x="0" y="0"/>
-          <a:chExt cx="0" cy="0"/>
-        </a:xfrm>
-      </p:grpSpPr>
-      <p:sp>
-        <p:nvSpPr>
-          <p:cNvPr id="2" name="Slide Image Placeholder 1"/>
-          <p:cNvSpPr>
-            <a:spLocks noGrp="1" noRot="1" noChangeAspect="1"/>
-          </p:cNvSpPr>
-          <p:nvPr>
-            <p:ph type="sldImg"/>
-          </p:nvPr>
-        </p:nvSpPr>
-        <p:spPr/>
-      </p:sp>
-      <p:sp>
-        <p:nvSpPr>
-          <p:cNvPr id="3" name="Notes Placeholder 2"/>
-          <p:cNvSpPr>
-            <a:spLocks noGrp="1"/>
-          </p:cNvSpPr>
-          <p:nvPr>
-            <p:ph type="body" idx="1"/>
-          </p:nvPr>
-        </p:nvSpPr>
-        <p:spPr/>
-        <p:txBody>
-          <a:bodyPr/>
-          <a:lstStyle/>
-          <a:p>
-            <a:r>
-              <a:rPr lang="en-US" dirty="0" smtClean="0"/>
-              <a:t>Wade will present what he made using</a:t>
-            </a:r>
-            <a:r>
-              <a:rPr lang="en-US" baseline="0" dirty="0" smtClean="0"/>
-              <a:t> MWF at this point.</a:t>
-            </a:r>
-            <a:endParaRPr lang="en-US" dirty="0"/>
-          </a:p>
-        </p:txBody>
-      </p:sp>
-      <p:sp>
-        <p:nvSpPr>
-          <p:cNvPr id="4" name="Slide Number Placeholder 3"/>
-          <p:cNvSpPr>
-            <a:spLocks noGrp="1"/>
-          </p:cNvSpPr>
-          <p:nvPr>
-            <p:ph type="sldNum" sz="quarter" idx="10"/>
-          </p:nvPr>
-        </p:nvSpPr>
-        <p:spPr/>
-        <p:txBody>
-          <a:bodyPr/>
-          <a:lstStyle/>
-          <a:p>
-            <a:fld id="{1A6845E6-538C-49EA-A830-9072524FC492}" type="slidenum">
-              <a:rPr lang="en-US" smtClean="0"/>
-              <a:t>19</a:t>
+              <a:t>16</a:t>
             </a:fld>
             <a:endParaRPr lang="en-US"/>
           </a:p>
@@ -2368,7 +2200,7 @@
           <a:p>
             <a:fld id="{B1B3241A-CC88-40CB-A269-FC6B849E1631}" type="datetimeFigureOut">
               <a:rPr lang="en-US" smtClean="0"/>
-              <a:t>11/7/11</a:t>
+              <a:t>11/4/2011</a:t>
             </a:fld>
             <a:endParaRPr lang="en-US"/>
           </a:p>
@@ -3485,7 +3317,7 @@
           <a:p>
             <a:fld id="{B1B3241A-CC88-40CB-A269-FC6B849E1631}" type="datetimeFigureOut">
               <a:rPr lang="en-US" smtClean="0"/>
-              <a:t>11/7/11</a:t>
+              <a:t>11/4/2011</a:t>
             </a:fld>
             <a:endParaRPr lang="en-US"/>
           </a:p>
@@ -4610,7 +4442,7 @@
           <a:p>
             <a:fld id="{B1B3241A-CC88-40CB-A269-FC6B849E1631}" type="datetimeFigureOut">
               <a:rPr lang="en-US" smtClean="0"/>
-              <a:t>11/7/11</a:t>
+              <a:t>11/4/2011</a:t>
             </a:fld>
             <a:endParaRPr lang="en-US"/>
           </a:p>
@@ -5730,7 +5562,7 @@
           <a:p>
             <a:fld id="{B1B3241A-CC88-40CB-A269-FC6B849E1631}" type="datetimeFigureOut">
               <a:rPr lang="en-US" smtClean="0"/>
-              <a:t>11/7/11</a:t>
+              <a:t>11/4/2011</a:t>
             </a:fld>
             <a:endParaRPr lang="en-US"/>
           </a:p>
@@ -7335,7 +7167,7 @@
           <a:p>
             <a:fld id="{B1B3241A-CC88-40CB-A269-FC6B849E1631}" type="datetimeFigureOut">
               <a:rPr lang="en-US" smtClean="0"/>
-              <a:t>11/7/11</a:t>
+              <a:t>11/4/2011</a:t>
             </a:fld>
             <a:endParaRPr lang="en-US"/>
           </a:p>
@@ -8405,7 +8237,7 @@
           <a:p>
             <a:fld id="{B1B3241A-CC88-40CB-A269-FC6B849E1631}" type="datetimeFigureOut">
               <a:rPr lang="en-US" smtClean="0"/>
-              <a:t>11/7/11</a:t>
+              <a:t>11/4/2011</a:t>
             </a:fld>
             <a:endParaRPr lang="en-US"/>
           </a:p>
@@ -9744,7 +9576,7 @@
           <a:p>
             <a:fld id="{B1B3241A-CC88-40CB-A269-FC6B849E1631}" type="datetimeFigureOut">
               <a:rPr lang="en-US" smtClean="0"/>
-              <a:t>11/7/11</a:t>
+              <a:t>11/4/2011</a:t>
             </a:fld>
             <a:endParaRPr lang="en-US"/>
           </a:p>
@@ -10893,7 +10725,7 @@
           <a:p>
             <a:fld id="{B1B3241A-CC88-40CB-A269-FC6B849E1631}" type="datetimeFigureOut">
               <a:rPr lang="en-US" smtClean="0"/>
-              <a:t>11/7/11</a:t>
+              <a:t>11/4/2011</a:t>
             </a:fld>
             <a:endParaRPr lang="en-US"/>
           </a:p>
@@ -11961,7 +11793,7 @@
           <a:p>
             <a:fld id="{B1B3241A-CC88-40CB-A269-FC6B849E1631}" type="datetimeFigureOut">
               <a:rPr lang="en-US" smtClean="0"/>
-              <a:t>11/7/11</a:t>
+              <a:t>11/4/2011</a:t>
             </a:fld>
             <a:endParaRPr lang="en-US"/>
           </a:p>
@@ -13011,7 +12843,7 @@
           <a:p>
             <a:fld id="{B1B3241A-CC88-40CB-A269-FC6B849E1631}" type="datetimeFigureOut">
               <a:rPr lang="en-US" smtClean="0"/>
-              <a:t>11/7/11</a:t>
+              <a:t>11/4/2011</a:t>
             </a:fld>
             <a:endParaRPr lang="en-US"/>
           </a:p>
@@ -14258,7 +14090,7 @@
           <a:p>
             <a:fld id="{B1B3241A-CC88-40CB-A269-FC6B849E1631}" type="datetimeFigureOut">
               <a:rPr lang="en-US" smtClean="0"/>
-              <a:t>11/7/11</a:t>
+              <a:t>11/4/2011</a:t>
             </a:fld>
             <a:endParaRPr lang="en-US"/>
           </a:p>
@@ -14623,7 +14455,7 @@
           <a:p>
             <a:fld id="{B1B3241A-CC88-40CB-A269-FC6B849E1631}" type="datetimeFigureOut">
               <a:rPr lang="en-US" smtClean="0"/>
-              <a:t>11/7/11</a:t>
+              <a:t>11/4/2011</a:t>
             </a:fld>
             <a:endParaRPr lang="en-US"/>
           </a:p>
@@ -15255,7 +15087,7 @@
   <p:timing>
     <p:tnLst>
       <p:par>
-        <p:cTn xmlns:p14="http://schemas.microsoft.com/office/powerpoint/2010/main" id="1" dur="indefinite" restart="never" nodeType="tmRoot"/>
+        <p:cTn id="1" dur="indefinite" restart="never" nodeType="tmRoot"/>
       </p:par>
     </p:tnLst>
   </p:timing>
@@ -15298,7 +15130,11 @@
           <a:p>
             <a:r>
               <a:rPr lang="en-US" dirty="0" smtClean="0"/>
-              <a:t>Architectural Design – Front End</a:t>
+              <a:t>Architectural </a:t>
+            </a:r>
+            <a:r>
+              <a:rPr lang="en-US" dirty="0" smtClean="0"/>
+              <a:t>Design – Front End</a:t>
             </a:r>
             <a:endParaRPr lang="en-US" dirty="0"/>
           </a:p>
@@ -15372,13 +15208,6 @@
       </p:transition>
     </mc:Fallback>
   </mc:AlternateContent>
-  <p:timing>
-    <p:tnLst>
-      <p:par>
-        <p:cTn xmlns:p14="http://schemas.microsoft.com/office/powerpoint/2010/main" id="1" dur="indefinite" restart="never" nodeType="tmRoot"/>
-      </p:par>
-    </p:tnLst>
-  </p:timing>
 </p:sld>
 </file>
 
@@ -15418,7 +15247,11 @@
           <a:p>
             <a:r>
               <a:rPr lang="en-US" dirty="0" smtClean="0"/>
-              <a:t>Architectural Design – Server SIDE</a:t>
+              <a:t>Architectural Design </a:t>
+            </a:r>
+            <a:r>
+              <a:rPr lang="en-US" dirty="0" smtClean="0"/>
+              <a:t>– Server SIDE</a:t>
             </a:r>
             <a:endParaRPr lang="en-US" dirty="0"/>
           </a:p>
@@ -15533,13 +15366,6 @@
       </p:transition>
     </mc:Fallback>
   </mc:AlternateContent>
-  <p:timing>
-    <p:tnLst>
-      <p:par>
-        <p:cTn xmlns:p14="http://schemas.microsoft.com/office/powerpoint/2010/main" id="1" dur="indefinite" restart="never" nodeType="tmRoot"/>
-      </p:par>
-    </p:tnLst>
-  </p:timing>
 </p:sld>
 </file>
 
@@ -15654,13 +15480,6 @@
       </p:transition>
     </mc:Fallback>
   </mc:AlternateContent>
-  <p:timing>
-    <p:tnLst>
-      <p:par>
-        <p:cTn xmlns:p14="http://schemas.microsoft.com/office/powerpoint/2010/main" id="1" dur="indefinite" restart="never" nodeType="tmRoot"/>
-      </p:par>
-    </p:tnLst>
-  </p:timing>
 </p:sld>
 </file>
 
@@ -15718,14 +15537,14 @@
           </a:ln>
           <a:effectLst/>
           <a:extLst>
-            <a:ext uri="{909E8E84-426E-40dd-AFC4-6F175D3DCCD1}">
+            <a:ext uri="{909E8E84-426E-40DD-AFC4-6F175D3DCCD1}">
               <a14:hiddenFill xmlns:a14="http://schemas.microsoft.com/office/drawing/2010/main">
                 <a:solidFill>
                   <a:schemeClr val="accent1"/>
                 </a:solidFill>
               </a14:hiddenFill>
             </a:ext>
-            <a:ext uri="{91240B29-F687-4f45-9708-019B960494DF}">
+            <a:ext uri="{91240B29-F687-4F45-9708-019B960494DF}">
               <a14:hiddenLine xmlns:a14="http://schemas.microsoft.com/office/drawing/2010/main" w="9525">
                 <a:solidFill>
                   <a:schemeClr val="tx1"/>
@@ -15735,7 +15554,7 @@
                 <a:tailEnd/>
               </a14:hiddenLine>
             </a:ext>
-            <a:ext uri="{AF507438-7753-43e0-B8FC-AC1667EBCBE1}">
+            <a:ext uri="{AF507438-7753-43E0-B8FC-AC1667EBCBE1}">
               <a14:hiddenEffects xmlns:a14="http://schemas.microsoft.com/office/drawing/2010/main">
                 <a:effectLst>
                   <a:outerShdw dist="35921" dir="2700000" algn="ctr" rotWithShape="0">
@@ -15792,13 +15611,6 @@
       </p:transition>
     </mc:Fallback>
   </mc:AlternateContent>
-  <p:timing>
-    <p:tnLst>
-      <p:par>
-        <p:cTn xmlns:p14="http://schemas.microsoft.com/office/powerpoint/2010/main" id="1" dur="indefinite" restart="never" nodeType="tmRoot"/>
-      </p:par>
-    </p:tnLst>
-  </p:timing>
 </p:sld>
 </file>
 
@@ -15966,13 +15778,6 @@
       </p:transition>
     </mc:Fallback>
   </mc:AlternateContent>
-  <p:timing>
-    <p:tnLst>
-      <p:par>
-        <p:cTn xmlns:p14="http://schemas.microsoft.com/office/powerpoint/2010/main" id="1" dur="indefinite" restart="never" nodeType="tmRoot"/>
-      </p:par>
-    </p:tnLst>
-  </p:timing>
 </p:sld>
 </file>
 
@@ -16018,9 +15823,9 @@
       </p:sp>
       <p:pic>
         <p:nvPicPr>
-          <p:cNvPr id="5" name="Content Placeholder 4" descr="Screen Shot 2011-11-04 at 1.02.04 PM.png"/>
+          <p:cNvPr id="4" name="Picture 2"/>
           <p:cNvPicPr>
-            <a:picLocks noGrp="1" noChangeAspect="1"/>
+            <a:picLocks noGrp="1" noChangeAspect="1" noChangeArrowheads="1"/>
           </p:cNvPicPr>
           <p:nvPr>
             <p:ph idx="1"/>
@@ -16034,16 +15839,52 @@
               </a:ext>
             </a:extLst>
           </a:blip>
-          <a:srcRect l="-13406" r="-13406"/>
+          <a:srcRect/>
           <a:stretch>
             <a:fillRect/>
           </a:stretch>
         </p:blipFill>
-        <p:spPr>
+        <p:spPr bwMode="auto">
           <a:xfrm>
-            <a:off x="-107300" y="1295400"/>
-            <a:ext cx="9358604" cy="4495800"/>
+            <a:off x="304800" y="1524000"/>
+            <a:ext cx="8537945" cy="3352800"/>
           </a:xfrm>
+          <a:prstGeom prst="rect">
+            <a:avLst/>
+          </a:prstGeom>
+          <a:noFill/>
+          <a:ln>
+            <a:noFill/>
+          </a:ln>
+          <a:effectLst/>
+          <a:extLst>
+            <a:ext uri="{909E8E84-426E-40DD-AFC4-6F175D3DCCD1}">
+              <a14:hiddenFill xmlns:a14="http://schemas.microsoft.com/office/drawing/2010/main">
+                <a:solidFill>
+                  <a:schemeClr val="accent1"/>
+                </a:solidFill>
+              </a14:hiddenFill>
+            </a:ext>
+            <a:ext uri="{91240B29-F687-4F45-9708-019B960494DF}">
+              <a14:hiddenLine xmlns:a14="http://schemas.microsoft.com/office/drawing/2010/main" w="9525">
+                <a:solidFill>
+                  <a:schemeClr val="tx1"/>
+                </a:solidFill>
+                <a:miter lim="800000"/>
+                <a:headEnd/>
+                <a:tailEnd/>
+              </a14:hiddenLine>
+            </a:ext>
+            <a:ext uri="{AF507438-7753-43E0-B8FC-AC1667EBCBE1}">
+              <a14:hiddenEffects xmlns:a14="http://schemas.microsoft.com/office/drawing/2010/main">
+                <a:effectLst>
+                  <a:outerShdw dist="35921" dir="2700000" algn="ctr" rotWithShape="0">
+                    <a:schemeClr val="bg2"/>
+                  </a:outerShdw>
+                </a:effectLst>
+              </a14:hiddenEffects>
+            </a:ext>
+          </a:extLst>
         </p:spPr>
       </p:pic>
     </p:spTree>
@@ -16068,13 +15909,6 @@
       </p:transition>
     </mc:Fallback>
   </mc:AlternateContent>
-  <p:timing>
-    <p:tnLst>
-      <p:par>
-        <p:cTn xmlns:p14="http://schemas.microsoft.com/office/powerpoint/2010/main" id="1" dur="indefinite" restart="never" nodeType="tmRoot"/>
-      </p:par>
-    </p:tnLst>
-  </p:timing>
 </p:sld>
 </file>
 
@@ -16112,7 +15946,7 @@
           <a:p>
             <a:r>
               <a:rPr lang="en-US" dirty="0" smtClean="0"/>
-              <a:t>Challenges</a:t>
+              <a:t>Prototype</a:t>
             </a:r>
             <a:endParaRPr lang="en-US" dirty="0"/>
           </a:p>
@@ -16128,121 +15962,26 @@
             <p:ph idx="1"/>
           </p:nvPr>
         </p:nvSpPr>
-        <p:spPr>
-          <a:xfrm>
-            <a:off x="685800" y="1371600"/>
-            <a:ext cx="7772400" cy="3962401"/>
-          </a:xfrm>
-        </p:spPr>
+        <p:spPr/>
         <p:txBody>
-          <a:bodyPr>
-            <a:normAutofit fontScale="92500" lnSpcReduction="20000"/>
-          </a:bodyPr>
+          <a:bodyPr/>
           <a:lstStyle/>
           <a:p>
             <a:r>
-              <a:rPr lang="en-US" dirty="0"/>
-              <a:t>Deciding Project Title/Domain Name</a:t>
-            </a:r>
-          </a:p>
-          <a:p>
-            <a:pPr lvl="1"/>
-            <a:r>
-              <a:rPr lang="en-US" dirty="0"/>
-              <a:t>Many domain names already taken</a:t>
-            </a:r>
-          </a:p>
-          <a:p>
-            <a:pPr lvl="1"/>
-            <a:r>
-              <a:rPr lang="en-US" dirty="0"/>
-              <a:t>Legality </a:t>
-            </a:r>
-            <a:r>
-              <a:rPr lang="en-US" dirty="0" smtClean="0"/>
-              <a:t>Issues</a:t>
-            </a:r>
-            <a:endParaRPr lang="en-US" dirty="0"/>
-          </a:p>
-          <a:p>
-            <a:r>
-              <a:rPr lang="en-US" dirty="0"/>
-              <a:t>Dividing project tasks</a:t>
-            </a:r>
-          </a:p>
-          <a:p>
-            <a:pPr lvl="1"/>
-            <a:r>
-              <a:rPr lang="en-US" dirty="0"/>
-              <a:t>Team is split up for different implementations</a:t>
-            </a:r>
-          </a:p>
-          <a:p>
-            <a:pPr lvl="2"/>
-            <a:r>
-              <a:rPr lang="en-US" dirty="0"/>
-              <a:t>Front end vs. back end</a:t>
-            </a:r>
-          </a:p>
-          <a:p>
-            <a:pPr lvl="2"/>
-            <a:r>
-              <a:rPr lang="en-US" dirty="0"/>
-              <a:t>Task Delegation</a:t>
-            </a:r>
-          </a:p>
-          <a:p>
-            <a:pPr lvl="2"/>
-            <a:r>
-              <a:rPr lang="en-US" dirty="0"/>
-              <a:t>Scheduling team meetings and conference call meetings</a:t>
-            </a:r>
-          </a:p>
-          <a:p>
-            <a:pPr lvl="2"/>
-            <a:r>
-              <a:rPr lang="en-US" dirty="0"/>
-              <a:t>Back end: </a:t>
-            </a:r>
-            <a:r>
-              <a:rPr lang="en-US" dirty="0" smtClean="0"/>
-              <a:t>Schema</a:t>
-            </a:r>
-            <a:endParaRPr lang="en-US" dirty="0"/>
-          </a:p>
-          <a:p>
-            <a:r>
-              <a:rPr lang="en-US" dirty="0"/>
-              <a:t>Choosing Facebook login type</a:t>
-            </a:r>
-          </a:p>
-          <a:p>
-            <a:pPr lvl="1"/>
-            <a:r>
-              <a:rPr lang="en-US" dirty="0"/>
-              <a:t>Button vs. Facebook login screen shot</a:t>
-            </a:r>
-          </a:p>
-          <a:p>
-            <a:pPr lvl="1"/>
-            <a:r>
-              <a:rPr lang="en-US" dirty="0"/>
-              <a:t>Facebook developer website difficult to navigate through</a:t>
-            </a:r>
-          </a:p>
-          <a:p>
-            <a:pPr lvl="1"/>
-            <a:r>
-              <a:rPr lang="en-US" dirty="0"/>
-              <a:t>Incorrect Facebook password at log-in provides incorrect navigation to messages page</a:t>
-            </a:r>
-          </a:p>
-          <a:p>
-            <a:pPr lvl="1"/>
-            <a:r>
-              <a:rPr lang="en-US" dirty="0"/>
-              <a:t>Home-page Facebook Login Button customization</a:t>
-            </a:r>
+              <a:rPr lang="en-US" sz="2800" dirty="0"/>
+              <a:t>http://whoop-txt.com/</a:t>
+            </a:r>
+          </a:p>
+          <a:p>
+            <a:r>
+              <a:rPr lang="en-US" sz="2800" dirty="0"/>
+              <a:t>Both desktop and smartphone </a:t>
+            </a:r>
+            <a:r>
+              <a:rPr lang="en-US" sz="2800" dirty="0" smtClean="0"/>
+              <a:t>demonstrations</a:t>
+            </a:r>
+            <a:endParaRPr lang="en-US" sz="2800" dirty="0"/>
           </a:p>
           <a:p>
             <a:endParaRPr lang="en-US" dirty="0"/>
@@ -16252,7 +15991,7 @@
     </p:spTree>
     <p:extLst>
       <p:ext uri="{BB962C8B-B14F-4D97-AF65-F5344CB8AC3E}">
-        <p14:creationId xmlns:p14="http://schemas.microsoft.com/office/powerpoint/2010/main" val="813159841"/>
+        <p14:creationId xmlns:p14="http://schemas.microsoft.com/office/powerpoint/2010/main" val="2418521225"/>
       </p:ext>
     </p:extLst>
   </p:cSld>
@@ -16271,13 +16010,6 @@
       </p:transition>
     </mc:Fallback>
   </mc:AlternateContent>
-  <p:timing>
-    <p:tnLst>
-      <p:par>
-        <p:cTn xmlns:p14="http://schemas.microsoft.com/office/powerpoint/2010/main" id="1" dur="indefinite" restart="never" nodeType="tmRoot"/>
-      </p:par>
-    </p:tnLst>
-  </p:timing>
 </p:sld>
 </file>
 
@@ -16315,7 +16047,7 @@
           <a:p>
             <a:r>
               <a:rPr lang="en-US" dirty="0" smtClean="0"/>
-              <a:t>Future tasks</a:t>
+              <a:t>Challenges</a:t>
             </a:r>
             <a:endParaRPr lang="en-US" dirty="0"/>
           </a:p>
@@ -16331,45 +16063,123 @@
             <p:ph idx="1"/>
           </p:nvPr>
         </p:nvSpPr>
-        <p:spPr/>
+        <p:spPr>
+          <a:xfrm>
+            <a:off x="685800" y="1371600"/>
+            <a:ext cx="7772400" cy="3962401"/>
+          </a:xfrm>
+        </p:spPr>
         <p:txBody>
-          <a:bodyPr/>
+          <a:bodyPr>
+            <a:normAutofit fontScale="92500" lnSpcReduction="20000"/>
+          </a:bodyPr>
           <a:lstStyle/>
           <a:p>
             <a:r>
               <a:rPr lang="en-US" dirty="0"/>
-              <a:t>Implement mass-text sending capability</a:t>
-            </a:r>
-          </a:p>
-          <a:p>
+              <a:t>Deciding Project Title/Domain Name</a:t>
+            </a:r>
+          </a:p>
+          <a:p>
+            <a:pPr lvl="1"/>
             <a:r>
               <a:rPr lang="en-US" dirty="0"/>
-              <a:t>Implement group creation</a:t>
-            </a:r>
-          </a:p>
-          <a:p>
+              <a:t>Many domain names already taken</a:t>
+            </a:r>
+          </a:p>
+          <a:p>
+            <a:pPr lvl="1"/>
             <a:r>
               <a:rPr lang="en-US" dirty="0"/>
-              <a:t>Incorporate geo-location API</a:t>
-            </a:r>
+              <a:t>Legality </a:t>
+            </a:r>
+            <a:r>
+              <a:rPr lang="en-US" dirty="0" smtClean="0"/>
+              <a:t>Issues</a:t>
+            </a:r>
+            <a:endParaRPr lang="en-US" dirty="0"/>
           </a:p>
           <a:p>
             <a:r>
               <a:rPr lang="en-US" dirty="0"/>
-              <a:t>Convert web application to native application</a:t>
-            </a:r>
-          </a:p>
-          <a:p>
+              <a:t>Dividing project tasks</a:t>
+            </a:r>
+          </a:p>
+          <a:p>
+            <a:pPr lvl="1"/>
             <a:r>
               <a:rPr lang="en-US" dirty="0"/>
-              <a:t>Refine user interface</a:t>
-            </a:r>
-          </a:p>
-          <a:p>
+              <a:t>Team is split up for different implementations</a:t>
+            </a:r>
+          </a:p>
+          <a:p>
+            <a:pPr lvl="2"/>
+            <a:r>
+              <a:rPr lang="en-US" dirty="0"/>
+              <a:t>Front end vs. back end</a:t>
+            </a:r>
+          </a:p>
+          <a:p>
+            <a:pPr lvl="2"/>
+            <a:r>
+              <a:rPr lang="en-US" dirty="0"/>
+              <a:t>Task Delegation</a:t>
+            </a:r>
+          </a:p>
+          <a:p>
+            <a:pPr lvl="2"/>
+            <a:r>
+              <a:rPr lang="en-US" dirty="0"/>
+              <a:t>Scheduling team meetings and conference call meetings</a:t>
+            </a:r>
+          </a:p>
+          <a:p>
+            <a:pPr lvl="2"/>
+            <a:r>
+              <a:rPr lang="en-US" dirty="0"/>
+              <a:t>Back end: </a:t>
+            </a:r>
             <a:r>
               <a:rPr lang="en-US" dirty="0" smtClean="0"/>
-              <a:t>Testing/Refactoring</a:t>
-            </a:r>
+              <a:t>Schema</a:t>
+            </a:r>
+            <a:endParaRPr lang="en-US" dirty="0"/>
+          </a:p>
+          <a:p>
+            <a:r>
+              <a:rPr lang="en-US" dirty="0"/>
+              <a:t>Choosing Facebook login type</a:t>
+            </a:r>
+          </a:p>
+          <a:p>
+            <a:pPr lvl="1"/>
+            <a:r>
+              <a:rPr lang="en-US" dirty="0"/>
+              <a:t>Button vs. Facebook login screen shot</a:t>
+            </a:r>
+          </a:p>
+          <a:p>
+            <a:pPr lvl="1"/>
+            <a:r>
+              <a:rPr lang="en-US" dirty="0"/>
+              <a:t>Facebook developer website difficult to navigate through</a:t>
+            </a:r>
+          </a:p>
+          <a:p>
+            <a:pPr lvl="1"/>
+            <a:r>
+              <a:rPr lang="en-US" dirty="0"/>
+              <a:t>Incorrect Facebook password at log-in provides incorrect navigation to messages page</a:t>
+            </a:r>
+          </a:p>
+          <a:p>
+            <a:pPr lvl="1"/>
+            <a:r>
+              <a:rPr lang="en-US" dirty="0"/>
+              <a:t>Home-page Facebook Login Button customization</a:t>
+            </a:r>
+          </a:p>
+          <a:p>
             <a:endParaRPr lang="en-US" dirty="0"/>
           </a:p>
         </p:txBody>
@@ -16377,7 +16187,7 @@
     </p:spTree>
     <p:extLst>
       <p:ext uri="{BB962C8B-B14F-4D97-AF65-F5344CB8AC3E}">
-        <p14:creationId xmlns:p14="http://schemas.microsoft.com/office/powerpoint/2010/main" val="4100035437"/>
+        <p14:creationId xmlns:p14="http://schemas.microsoft.com/office/powerpoint/2010/main" val="813159841"/>
       </p:ext>
     </p:extLst>
   </p:cSld>
@@ -16396,13 +16206,6 @@
       </p:transition>
     </mc:Fallback>
   </mc:AlternateContent>
-  <p:timing>
-    <p:tnLst>
-      <p:par>
-        <p:cTn xmlns:p14="http://schemas.microsoft.com/office/powerpoint/2010/main" id="1" dur="indefinite" restart="never" nodeType="tmRoot"/>
-      </p:par>
-    </p:tnLst>
-  </p:timing>
 </p:sld>
 </file>
 
@@ -16440,7 +16243,7 @@
           <a:p>
             <a:r>
               <a:rPr lang="en-US" dirty="0" smtClean="0"/>
-              <a:t>Special Thanks to:</a:t>
+              <a:t>Future tasks</a:t>
             </a:r>
             <a:endParaRPr lang="en-US" dirty="0"/>
           </a:p>
@@ -16456,96 +16259,53 @@
             <p:ph idx="1"/>
           </p:nvPr>
         </p:nvSpPr>
-        <p:spPr>
-          <a:xfrm>
-            <a:off x="685800" y="1600200"/>
-            <a:ext cx="7772400" cy="3962399"/>
-          </a:xfrm>
-        </p:spPr>
+        <p:spPr/>
         <p:txBody>
-          <a:bodyPr>
-            <a:normAutofit/>
-          </a:bodyPr>
+          <a:bodyPr/>
           <a:lstStyle/>
           <a:p>
-            <a:pPr lvl="1"/>
-            <a:r>
-              <a:rPr lang="en-US" sz="1800" dirty="0" err="1" smtClean="0"/>
-              <a:t>Gergana</a:t>
-            </a:r>
-            <a:r>
-              <a:rPr lang="en-US" sz="1800" dirty="0" smtClean="0"/>
-              <a:t> Markova (Client)</a:t>
-            </a:r>
-          </a:p>
-          <a:p>
-            <a:pPr lvl="1"/>
-            <a:r>
-              <a:rPr lang="en-US" sz="1800" dirty="0" smtClean="0"/>
-              <a:t>IBM technical mentors</a:t>
-            </a:r>
-          </a:p>
-          <a:p>
-            <a:pPr lvl="2"/>
-            <a:r>
-              <a:rPr lang="en-US" sz="1800" dirty="0" smtClean="0"/>
-              <a:t>Chris </a:t>
-            </a:r>
-            <a:r>
-              <a:rPr lang="en-US" sz="1800" dirty="0" err="1" smtClean="0"/>
-              <a:t>Montalvo</a:t>
-            </a:r>
-            <a:endParaRPr lang="en-US" sz="1800" dirty="0" smtClean="0"/>
-          </a:p>
-          <a:p>
-            <a:pPr lvl="2"/>
-            <a:r>
-              <a:rPr lang="en-US" sz="1800" dirty="0" smtClean="0"/>
-              <a:t>Dean </a:t>
-            </a:r>
-            <a:r>
-              <a:rPr lang="en-US" sz="1800" dirty="0" err="1" smtClean="0"/>
-              <a:t>Ocamura</a:t>
-            </a:r>
-            <a:endParaRPr lang="en-US" sz="1800" dirty="0" smtClean="0"/>
-          </a:p>
-          <a:p>
-            <a:pPr lvl="2"/>
-            <a:r>
-              <a:rPr lang="en-US" sz="1800" dirty="0" smtClean="0"/>
-              <a:t>Michael Stein</a:t>
-            </a:r>
-          </a:p>
-          <a:p>
-            <a:pPr lvl="2"/>
-            <a:r>
-              <a:rPr lang="en-US" sz="1800" dirty="0" smtClean="0"/>
-              <a:t>Neil </a:t>
-            </a:r>
-            <a:r>
-              <a:rPr lang="en-US" sz="1800" dirty="0" err="1" smtClean="0"/>
-              <a:t>Sahota</a:t>
-            </a:r>
-            <a:endParaRPr lang="en-US" sz="1800" dirty="0" smtClean="0"/>
-          </a:p>
-          <a:p>
-            <a:pPr lvl="2"/>
-            <a:r>
-              <a:rPr lang="en-US" sz="1800" dirty="0" smtClean="0"/>
-              <a:t>Steve </a:t>
-            </a:r>
-            <a:r>
-              <a:rPr lang="en-US" sz="1800" dirty="0" err="1" smtClean="0"/>
-              <a:t>Havachi</a:t>
-            </a:r>
-            <a:endParaRPr lang="en-US" sz="1800" dirty="0"/>
+            <a:r>
+              <a:rPr lang="en-US" dirty="0"/>
+              <a:t>Implement mass-text sending capability</a:t>
+            </a:r>
+          </a:p>
+          <a:p>
+            <a:r>
+              <a:rPr lang="en-US" dirty="0"/>
+              <a:t>Implement group creation</a:t>
+            </a:r>
+          </a:p>
+          <a:p>
+            <a:r>
+              <a:rPr lang="en-US" dirty="0"/>
+              <a:t>Incorporate geo-location API</a:t>
+            </a:r>
+          </a:p>
+          <a:p>
+            <a:r>
+              <a:rPr lang="en-US" dirty="0"/>
+              <a:t>Convert web application to native application</a:t>
+            </a:r>
+          </a:p>
+          <a:p>
+            <a:r>
+              <a:rPr lang="en-US" dirty="0"/>
+              <a:t>Refine user interface</a:t>
+            </a:r>
+          </a:p>
+          <a:p>
+            <a:r>
+              <a:rPr lang="en-US" dirty="0" smtClean="0"/>
+              <a:t>Testing/Refactoring</a:t>
+            </a:r>
+            <a:endParaRPr lang="en-US" dirty="0"/>
           </a:p>
         </p:txBody>
       </p:sp>
     </p:spTree>
     <p:extLst>
       <p:ext uri="{BB962C8B-B14F-4D97-AF65-F5344CB8AC3E}">
-        <p14:creationId xmlns:p14="http://schemas.microsoft.com/office/powerpoint/2010/main" val="2901881089"/>
+        <p14:creationId xmlns:p14="http://schemas.microsoft.com/office/powerpoint/2010/main" val="4100035437"/>
       </p:ext>
     </p:extLst>
   </p:cSld>
@@ -16564,13 +16324,6 @@
       </p:transition>
     </mc:Fallback>
   </mc:AlternateContent>
-  <p:timing>
-    <p:tnLst>
-      <p:par>
-        <p:cTn xmlns:p14="http://schemas.microsoft.com/office/powerpoint/2010/main" id="1" dur="indefinite" restart="never" nodeType="tmRoot"/>
-      </p:par>
-    </p:tnLst>
-  </p:timing>
 </p:sld>
 </file>
 
@@ -16608,7 +16361,7 @@
           <a:p>
             <a:r>
               <a:rPr lang="en-US" dirty="0" smtClean="0"/>
-              <a:t>Prototype</a:t>
+              <a:t>The End</a:t>
             </a:r>
             <a:endParaRPr lang="en-US" dirty="0"/>
           </a:p>
@@ -16624,36 +16377,113 @@
             <p:ph idx="1"/>
           </p:nvPr>
         </p:nvSpPr>
-        <p:spPr/>
+        <p:spPr>
+          <a:xfrm>
+            <a:off x="685800" y="1600200"/>
+            <a:ext cx="7772400" cy="3962399"/>
+          </a:xfrm>
+        </p:spPr>
         <p:txBody>
-          <a:bodyPr/>
+          <a:bodyPr>
+            <a:normAutofit/>
+          </a:bodyPr>
           <a:lstStyle/>
           <a:p>
             <a:r>
-              <a:rPr lang="en-US" sz="2800" dirty="0"/>
-              <a:t>http://whoop-txt.com/</a:t>
-            </a:r>
-          </a:p>
-          <a:p>
-            <a:r>
-              <a:rPr lang="en-US" sz="2800" dirty="0"/>
-              <a:t>Both desktop and smartphone </a:t>
-            </a:r>
-            <a:r>
-              <a:rPr lang="en-US" sz="2800" dirty="0" smtClean="0"/>
-              <a:t>demonstrations</a:t>
-            </a:r>
-            <a:endParaRPr lang="en-US" sz="2800" dirty="0"/>
-          </a:p>
-          <a:p>
-            <a:endParaRPr lang="en-US" dirty="0"/>
+              <a:rPr lang="en-US" sz="2400" dirty="0"/>
+              <a:t>Thank you for listening</a:t>
+            </a:r>
+            <a:r>
+              <a:rPr lang="en-US" sz="2400" dirty="0" smtClean="0"/>
+              <a:t>! Any questions?</a:t>
+            </a:r>
+            <a:endParaRPr lang="en-US" sz="2400" dirty="0"/>
+          </a:p>
+          <a:p>
+            <a:r>
+              <a:rPr lang="en-US" sz="2400" dirty="0" smtClean="0"/>
+              <a:t>Special thanks to:</a:t>
+            </a:r>
+          </a:p>
+          <a:p>
+            <a:pPr lvl="1"/>
+            <a:r>
+              <a:rPr lang="en-US" sz="1800" dirty="0" err="1" smtClean="0"/>
+              <a:t>Gergana</a:t>
+            </a:r>
+            <a:r>
+              <a:rPr lang="en-US" sz="1800" dirty="0" smtClean="0"/>
+              <a:t> Markova (Client)</a:t>
+            </a:r>
+          </a:p>
+          <a:p>
+            <a:pPr lvl="1"/>
+            <a:r>
+              <a:rPr lang="en-US" sz="1800" dirty="0" smtClean="0"/>
+              <a:t>IBM technical mentors</a:t>
+            </a:r>
+          </a:p>
+          <a:p>
+            <a:pPr lvl="2"/>
+            <a:r>
+              <a:rPr lang="en-US" sz="1600" dirty="0" smtClean="0"/>
+              <a:t>Chris </a:t>
+            </a:r>
+            <a:r>
+              <a:rPr lang="en-US" sz="1600" dirty="0" err="1" smtClean="0"/>
+              <a:t>Montalvo</a:t>
+            </a:r>
+            <a:endParaRPr lang="en-US" sz="1600" dirty="0" smtClean="0"/>
+          </a:p>
+          <a:p>
+            <a:pPr lvl="2"/>
+            <a:r>
+              <a:rPr lang="en-US" sz="1600" dirty="0" smtClean="0"/>
+              <a:t>Dean </a:t>
+            </a:r>
+            <a:r>
+              <a:rPr lang="en-US" sz="1600" dirty="0" err="1" smtClean="0"/>
+              <a:t>Ocamura</a:t>
+            </a:r>
+            <a:endParaRPr lang="en-US" sz="1600" dirty="0" smtClean="0"/>
+          </a:p>
+          <a:p>
+            <a:pPr lvl="2"/>
+            <a:r>
+              <a:rPr lang="en-US" sz="1600" dirty="0" smtClean="0"/>
+              <a:t>Michael Stein</a:t>
+            </a:r>
+          </a:p>
+          <a:p>
+            <a:pPr lvl="2"/>
+            <a:r>
+              <a:rPr lang="en-US" sz="1600" dirty="0" smtClean="0"/>
+              <a:t>Neil </a:t>
+            </a:r>
+            <a:r>
+              <a:rPr lang="en-US" sz="1600" dirty="0" err="1" smtClean="0"/>
+              <a:t>Sahota</a:t>
+            </a:r>
+            <a:endParaRPr lang="en-US" sz="1600" dirty="0" smtClean="0"/>
+          </a:p>
+          <a:p>
+            <a:pPr lvl="2"/>
+            <a:r>
+              <a:rPr lang="en-US" sz="1600" dirty="0" smtClean="0"/>
+              <a:t>Steve </a:t>
+            </a:r>
+            <a:r>
+              <a:rPr lang="en-US" sz="1600" dirty="0" err="1" smtClean="0"/>
+              <a:t>Havachi</a:t>
+            </a:r>
+            <a:endParaRPr lang="en-US" sz="1600" dirty="0"/>
           </a:p>
         </p:txBody>
       </p:sp>
     </p:spTree>
     <p:extLst>
       <p:ext uri="{BB962C8B-B14F-4D97-AF65-F5344CB8AC3E}">
-        <p14:creationId xmlns:p14="http://schemas.microsoft.com/office/powerpoint/2010/main" val="2418521225"/>
+        <p14:creationId xmlns:p14="http://schemas.microsoft.com/office/powerpoint/2010/main" val="2901881089"/>
       </p:ext>
     </p:extLst>
   </p:cSld>
@@ -16672,13 +16502,6 @@
       </p:transition>
     </mc:Fallback>
   </mc:AlternateContent>
-  <p:timing>
-    <p:tnLst>
-      <p:par>
-        <p:cTn xmlns:p14="http://schemas.microsoft.com/office/powerpoint/2010/main" id="1" dur="indefinite" restart="never" nodeType="tmRoot"/>
-      </p:par>
-    </p:tnLst>
-  </p:timing>
 </p:sld>
 </file>
 
@@ -16804,7 +16627,7 @@
   <p:timing>
     <p:tnLst>
       <p:par>
-        <p:cTn xmlns:p14="http://schemas.microsoft.com/office/powerpoint/2010/main" id="1" dur="indefinite" restart="never" nodeType="tmRoot"/>
+        <p:cTn id="1" dur="indefinite" restart="never" nodeType="tmRoot"/>
       </p:par>
     </p:tnLst>
   </p:timing>
@@ -16981,7 +16804,7 @@
   <p:timing>
     <p:tnLst>
       <p:par>
-        <p:cTn xmlns:p14="http://schemas.microsoft.com/office/powerpoint/2010/main" id="1" dur="indefinite" restart="never" nodeType="tmRoot"/>
+        <p:cTn id="1" dur="indefinite" restart="never" nodeType="tmRoot"/>
       </p:par>
     </p:tnLst>
   </p:timing>
@@ -17116,7 +16939,7 @@
   <p:timing>
     <p:tnLst>
       <p:par>
-        <p:cTn xmlns:p14="http://schemas.microsoft.com/office/powerpoint/2010/main" id="1" dur="indefinite" restart="never" nodeType="tmRoot"/>
+        <p:cTn id="1" dur="indefinite" restart="never" nodeType="tmRoot"/>
       </p:par>
     </p:tnLst>
   </p:timing>
@@ -17275,7 +17098,7 @@
   <p:timing>
     <p:tnLst>
       <p:par>
-        <p:cTn xmlns:p14="http://schemas.microsoft.com/office/powerpoint/2010/main" id="1" dur="indefinite" restart="never" nodeType="tmRoot"/>
+        <p:cTn id="1" dur="indefinite" restart="never" nodeType="tmRoot"/>
       </p:par>
     </p:tnLst>
   </p:timing>
@@ -17414,7 +17237,7 @@
   <p:timing>
     <p:tnLst>
       <p:par>
-        <p:cTn xmlns:p14="http://schemas.microsoft.com/office/powerpoint/2010/main" id="1" dur="indefinite" restart="never" nodeType="tmRoot"/>
+        <p:cTn id="1" dur="indefinite" restart="never" nodeType="tmRoot"/>
       </p:par>
     </p:tnLst>
   </p:timing>
@@ -17463,7 +17286,7 @@
       </p:sp>
       <p:sp>
         <p:nvSpPr>
-          <p:cNvPr id="4" name="Content Placeholder 3"/>
+          <p:cNvPr id="3" name="Content Placeholder 2"/>
           <p:cNvSpPr>
             <a:spLocks noGrp="1"/>
           </p:cNvSpPr>
@@ -17471,15 +17294,10 @@
             <p:ph idx="1"/>
           </p:nvPr>
         </p:nvSpPr>
-        <p:spPr>
-          <a:xfrm>
-            <a:off x="685800" y="1600201"/>
-            <a:ext cx="5257800" cy="3733800"/>
-          </a:xfrm>
-        </p:spPr>
+        <p:spPr/>
         <p:txBody>
           <a:bodyPr>
-            <a:normAutofit fontScale="92500" lnSpcReduction="10000"/>
+            <a:normAutofit/>
           </a:bodyPr>
           <a:lstStyle/>
           <a:p>
@@ -17525,14 +17343,22 @@
             <a:pPr lvl="2"/>
             <a:r>
               <a:rPr lang="en-US" dirty="0"/>
-              <a:t>Whoop It- Takes you to the Write Message Page.</a:t>
+              <a:t>Home - Takes you to the Message Stream </a:t>
+            </a:r>
+            <a:r>
+              <a:rPr lang="en-US" dirty="0" smtClean="0"/>
+              <a:t>Page</a:t>
+            </a:r>
+            <a:r>
+              <a:rPr lang="en-US" dirty="0"/>
+              <a:t>.</a:t>
             </a:r>
           </a:p>
           <a:p>
             <a:pPr lvl="2"/>
             <a:r>
               <a:rPr lang="en-US" dirty="0"/>
-              <a:t>Messages - Directs you to the Message Stream Page.</a:t>
+              <a:t>New Message - Directs you to the Write Message Page. </a:t>
             </a:r>
           </a:p>
           <a:p>
@@ -17541,164 +17367,6 @@
               <a:rPr lang="en-US" dirty="0"/>
               <a:t>Groups - Directs you to the Groups Page. </a:t>
             </a:r>
-          </a:p>
-          <a:p>
-            <a:pPr lvl="2"/>
-            <a:r>
-              <a:rPr lang="en-US" dirty="0"/>
-              <a:t>Invitations – Directs you to the Invitations Page.</a:t>
-            </a:r>
-          </a:p>
-          <a:p>
-            <a:endParaRPr lang="en-US" dirty="0"/>
-          </a:p>
-        </p:txBody>
-      </p:sp>
-      <p:pic>
-        <p:nvPicPr>
-          <p:cNvPr id="5" name="Picture 4" descr="Screen Shot 2011-11-04 at 1.03.12 PM.png"/>
-          <p:cNvPicPr>
-            <a:picLocks noChangeAspect="1"/>
-          </p:cNvPicPr>
-          <p:nvPr/>
-        </p:nvPicPr>
-        <p:blipFill>
-          <a:blip r:embed="rId3">
-            <a:extLst>
-              <a:ext uri="{28A0092B-C50C-407E-A947-70E740481C1C}">
-                <a14:useLocalDpi xmlns:a14="http://schemas.microsoft.com/office/drawing/2010/main" val="0"/>
-              </a:ext>
-            </a:extLst>
-          </a:blip>
-          <a:stretch>
-            <a:fillRect/>
-          </a:stretch>
-        </p:blipFill>
-        <p:spPr>
-          <a:xfrm>
-            <a:off x="6019800" y="2667000"/>
-            <a:ext cx="2362200" cy="2971800"/>
-          </a:xfrm>
-          <a:prstGeom prst="rect">
-            <a:avLst/>
-          </a:prstGeom>
-        </p:spPr>
-      </p:pic>
-      <p:pic>
-        <p:nvPicPr>
-          <p:cNvPr id="6" name="Picture 5"/>
-          <p:cNvPicPr>
-            <a:picLocks noChangeAspect="1" noChangeArrowheads="1"/>
-          </p:cNvPicPr>
-          <p:nvPr/>
-        </p:nvPicPr>
-        <p:blipFill rotWithShape="1">
-          <a:blip r:embed="rId4">
-            <a:extLst>
-              <a:ext uri="{28A0092B-C50C-407E-A947-70E740481C1C}">
-                <a14:useLocalDpi xmlns:a14="http://schemas.microsoft.com/office/drawing/2010/main" val="0"/>
-              </a:ext>
-            </a:extLst>
-          </a:blip>
-          <a:srcRect l="3807" t="22178" r="4450" b="52106"/>
-          <a:stretch/>
-        </p:blipFill>
-        <p:spPr bwMode="auto">
-          <a:xfrm>
-            <a:off x="6019800" y="1295400"/>
-            <a:ext cx="2362200" cy="1027729"/>
-          </a:xfrm>
-          <a:prstGeom prst="rect">
-            <a:avLst/>
-          </a:prstGeom>
-          <a:noFill/>
-          <a:ln>
-            <a:noFill/>
-          </a:ln>
-          <a:effectLst/>
-          <a:extLst>
-            <a:ext uri="{909E8E84-426E-40dd-AFC4-6F175D3DCCD1}">
-              <a14:hiddenFill xmlns:a14="http://schemas.microsoft.com/office/drawing/2010/main">
-                <a:solidFill>
-                  <a:schemeClr val="accent1"/>
-                </a:solidFill>
-              </a14:hiddenFill>
-            </a:ext>
-            <a:ext uri="{91240B29-F687-4f45-9708-019B960494DF}">
-              <a14:hiddenLine xmlns:a14="http://schemas.microsoft.com/office/drawing/2010/main" w="9525">
-                <a:solidFill>
-                  <a:schemeClr val="tx1"/>
-                </a:solidFill>
-                <a:miter lim="800000"/>
-                <a:headEnd/>
-                <a:tailEnd/>
-              </a14:hiddenLine>
-            </a:ext>
-            <a:ext uri="{AF507438-7753-43e0-B8FC-AC1667EBCBE1}">
-              <a14:hiddenEffects xmlns:a14="http://schemas.microsoft.com/office/drawing/2010/main">
-                <a:effectLst>
-                  <a:outerShdw dist="35921" dir="2700000" algn="ctr" rotWithShape="0">
-                    <a:schemeClr val="bg2"/>
-                  </a:outerShdw>
-                </a:effectLst>
-              </a14:hiddenEffects>
-            </a:ext>
-          </a:extLst>
-        </p:spPr>
-      </p:pic>
-      <p:sp>
-        <p:nvSpPr>
-          <p:cNvPr id="7" name="TextBox 6"/>
-          <p:cNvSpPr txBox="1"/>
-          <p:nvPr/>
-        </p:nvSpPr>
-        <p:spPr>
-          <a:xfrm>
-            <a:off x="5992917" y="2667000"/>
-            <a:ext cx="941283" cy="276999"/>
-          </a:xfrm>
-          <a:prstGeom prst="rect">
-            <a:avLst/>
-          </a:prstGeom>
-          <a:noFill/>
-        </p:spPr>
-        <p:txBody>
-          <a:bodyPr wrap="none" rtlCol="0">
-            <a:spAutoFit/>
-          </a:bodyPr>
-          <a:lstStyle/>
-          <a:p>
-            <a:r>
-              <a:rPr lang="en-US" sz="1200" dirty="0" smtClean="0"/>
-              <a:t>Whoop-Txt</a:t>
-            </a:r>
-            <a:endParaRPr lang="en-US" sz="1200" dirty="0"/>
-          </a:p>
-        </p:txBody>
-      </p:sp>
-      <p:sp>
-        <p:nvSpPr>
-          <p:cNvPr id="8" name="TextBox 7"/>
-          <p:cNvSpPr txBox="1"/>
-          <p:nvPr/>
-        </p:nvSpPr>
-        <p:spPr>
-          <a:xfrm>
-            <a:off x="5163081" y="5849041"/>
-            <a:ext cx="184666" cy="369332"/>
-          </a:xfrm>
-          <a:prstGeom prst="rect">
-            <a:avLst/>
-          </a:prstGeom>
-          <a:noFill/>
-        </p:spPr>
-        <p:txBody>
-          <a:bodyPr wrap="none" rtlCol="0">
-            <a:spAutoFit/>
-          </a:bodyPr>
-          <a:lstStyle/>
-          <a:p>
-            <a:endParaRPr lang="en-US" dirty="0"/>
           </a:p>
         </p:txBody>
       </p:sp>
@@ -17727,7 +17395,7 @@
   <p:timing>
     <p:tnLst>
       <p:par>
-        <p:cTn xmlns:p14="http://schemas.microsoft.com/office/powerpoint/2010/main" id="1" dur="indefinite" restart="never" nodeType="tmRoot"/>
+        <p:cTn id="1" dur="indefinite" restart="never" nodeType="tmRoot"/>
       </p:par>
     </p:tnLst>
   </p:timing>
@@ -17791,14 +17459,14 @@
           <a:p>
             <a:r>
               <a:rPr lang="en-US" dirty="0"/>
-              <a:t>Whoop It page</a:t>
+              <a:t>New Message page</a:t>
             </a:r>
           </a:p>
           <a:p>
             <a:pPr lvl="1"/>
             <a:r>
               <a:rPr lang="en-US" dirty="0"/>
-              <a:t>Allows you to share posts to other Whoop-Txt users. The user will have the choice of explicitly selecting “tags” that will modify who will be able to see or be notified of this post or they can text people a certain distance away from them. </a:t>
+              <a:t>Allows you to send posts to other Whoop-Txt users. The user will have the choice of explicitly selecting “tags” that will modify who will be able to see or be notified of this post or they can text people a certain distance away from them. </a:t>
             </a:r>
           </a:p>
           <a:p>
@@ -17808,42 +17476,11 @@
             </a:r>
           </a:p>
           <a:p>
-            <a:pPr marL="742950" lvl="2"/>
-            <a:r>
-              <a:rPr lang="en-US" sz="1600" dirty="0"/>
+            <a:pPr lvl="1"/>
+            <a:r>
+              <a:rPr lang="en-US" dirty="0"/>
               <a:t>Lists all the groups the user is a part of, whether it is one they have created or have been added to. Users will be able to create custom groups and view members within the groups. </a:t>
             </a:r>
-          </a:p>
-          <a:p>
-            <a:r>
-              <a:rPr lang="en-US" dirty="0"/>
-              <a:t>Invitations</a:t>
-            </a:r>
-          </a:p>
-          <a:p>
-            <a:pPr lvl="1"/>
-            <a:r>
-              <a:rPr lang="en-US" dirty="0"/>
-              <a:t>View your pending requests to join other groups</a:t>
-            </a:r>
-          </a:p>
-          <a:p>
-            <a:r>
-              <a:rPr lang="en-US" dirty="0"/>
-              <a:t>Help and View Full Site</a:t>
-            </a:r>
-          </a:p>
-          <a:p>
-            <a:pPr lvl="1"/>
-            <a:endParaRPr lang="en-US" dirty="0"/>
-          </a:p>
-          <a:p>
-            <a:pPr lvl="1"/>
-            <a:endParaRPr lang="en-US" dirty="0"/>
-          </a:p>
-          <a:p>
-            <a:pPr lvl="1"/>
-            <a:endParaRPr lang="en-US" dirty="0"/>
           </a:p>
         </p:txBody>
       </p:sp>
@@ -17872,7 +17509,7 @@
   <p:timing>
     <p:tnLst>
       <p:par>
-        <p:cTn xmlns:p14="http://schemas.microsoft.com/office/powerpoint/2010/main" id="1" dur="indefinite" restart="never" nodeType="tmRoot"/>
+        <p:cTn id="1" dur="indefinite" restart="never" nodeType="tmRoot"/>
       </p:par>
     </p:tnLst>
   </p:timing>
@@ -17906,12 +17543,7 @@
             <p:ph type="title"/>
           </p:nvPr>
         </p:nvSpPr>
-        <p:spPr>
-          <a:xfrm>
-            <a:off x="609600" y="0"/>
-            <a:ext cx="7772400" cy="1143000"/>
-          </a:xfrm>
-        </p:spPr>
+        <p:spPr/>
         <p:txBody>
           <a:bodyPr/>
           <a:lstStyle/>
@@ -17925,33 +17557,67 @@
       </p:sp>
       <p:pic>
         <p:nvPicPr>
-          <p:cNvPr id="6" name="Content Placeholder 4" descr="specs1.jpg"/>
+          <p:cNvPr id="4" name="Picture 2"/>
           <p:cNvPicPr>
-            <a:picLocks noChangeAspect="1"/>
+            <a:picLocks noGrp="1" noChangeAspect="1" noChangeArrowheads="1"/>
           </p:cNvPicPr>
-          <p:nvPr/>
+          <p:nvPr>
+            <p:ph idx="1"/>
+          </p:nvPr>
         </p:nvPicPr>
         <p:blipFill>
-          <a:blip r:embed="rId3">
+          <a:blip r:embed="rId2">
             <a:extLst>
               <a:ext uri="{28A0092B-C50C-407E-A947-70E740481C1C}">
                 <a14:useLocalDpi xmlns:a14="http://schemas.microsoft.com/office/drawing/2010/main" val="0"/>
               </a:ext>
             </a:extLst>
           </a:blip>
-          <a:srcRect l="-33562" r="-33562"/>
           <a:stretch>
             <a:fillRect/>
           </a:stretch>
         </p:blipFill>
-        <p:spPr>
+        <p:spPr bwMode="auto">
           <a:xfrm>
-            <a:off x="762000" y="914399"/>
-            <a:ext cx="7086600" cy="4724401"/>
+            <a:off x="1600200" y="1295400"/>
+            <a:ext cx="6096000" cy="4837407"/>
           </a:xfrm>
           <a:prstGeom prst="rect">
             <a:avLst/>
           </a:prstGeom>
+          <a:noFill/>
+          <a:ln>
+            <a:noFill/>
+          </a:ln>
+          <a:effectLst/>
+          <a:extLst>
+            <a:ext uri="{909E8E84-426E-40DD-AFC4-6F175D3DCCD1}">
+              <a14:hiddenFill xmlns:a14="http://schemas.microsoft.com/office/drawing/2010/main">
+                <a:solidFill>
+                  <a:schemeClr val="accent1"/>
+                </a:solidFill>
+              </a14:hiddenFill>
+            </a:ext>
+            <a:ext uri="{91240B29-F687-4F45-9708-019B960494DF}">
+              <a14:hiddenLine xmlns:a14="http://schemas.microsoft.com/office/drawing/2010/main" w="9525">
+                <a:solidFill>
+                  <a:schemeClr val="tx1"/>
+                </a:solidFill>
+                <a:miter lim="800000"/>
+                <a:headEnd/>
+                <a:tailEnd/>
+              </a14:hiddenLine>
+            </a:ext>
+            <a:ext uri="{AF507438-7753-43E0-B8FC-AC1667EBCBE1}">
+              <a14:hiddenEffects xmlns:a14="http://schemas.microsoft.com/office/drawing/2010/main">
+                <a:effectLst>
+                  <a:outerShdw dist="35921" dir="2700000" algn="ctr" rotWithShape="0">
+                    <a:schemeClr val="bg2"/>
+                  </a:outerShdw>
+                </a:effectLst>
+              </a14:hiddenEffects>
+            </a:ext>
+          </a:extLst>
         </p:spPr>
       </p:pic>
     </p:spTree>
@@ -17979,7 +17645,7 @@
   <p:timing>
     <p:tnLst>
       <p:par>
-        <p:cTn xmlns:p14="http://schemas.microsoft.com/office/powerpoint/2010/main" id="1" dur="indefinite" restart="never" nodeType="tmRoot"/>
+        <p:cTn id="1" dur="indefinite" restart="never" nodeType="tmRoot"/>
       </p:par>
     </p:tnLst>
   </p:timing>

</xml_diff>